<commit_message>
(anna) updated report, presentation, added to-do list.
</commit_message>
<xml_diff>
--- a/presentation/CSC213_presentation.pptx
+++ b/presentation/CSC213_presentation.pptx
@@ -5,17 +5,20 @@
     <p:sldMasterId id="2147483648" r:id="rId1"/>
   </p:sldMasterIdLst>
   <p:notesMasterIdLst>
-    <p:notesMasterId r:id="rId10"/>
+    <p:notesMasterId r:id="rId13"/>
   </p:notesMasterIdLst>
   <p:sldIdLst>
     <p:sldId id="256" r:id="rId2"/>
-    <p:sldId id="257" r:id="rId3"/>
-    <p:sldId id="258" r:id="rId4"/>
-    <p:sldId id="259" r:id="rId5"/>
-    <p:sldId id="260" r:id="rId6"/>
-    <p:sldId id="263" r:id="rId7"/>
-    <p:sldId id="261" r:id="rId8"/>
-    <p:sldId id="262" r:id="rId9"/>
+    <p:sldId id="264" r:id="rId3"/>
+    <p:sldId id="265" r:id="rId4"/>
+    <p:sldId id="257" r:id="rId5"/>
+    <p:sldId id="258" r:id="rId6"/>
+    <p:sldId id="259" r:id="rId7"/>
+    <p:sldId id="260" r:id="rId8"/>
+    <p:sldId id="261" r:id="rId9"/>
+    <p:sldId id="266" r:id="rId10"/>
+    <p:sldId id="267" r:id="rId11"/>
+    <p:sldId id="262" r:id="rId12"/>
   </p:sldIdLst>
   <p:sldSz cx="9144000" cy="6858000" type="screen4x3"/>
   <p:notesSz cx="6858000" cy="9144000"/>
@@ -199,7 +202,7 @@
           <a:p>
             <a:fld id="{6C2E843D-2D96-1E41-984A-14C417F27F0E}" type="datetimeFigureOut">
               <a:rPr lang="en-US" smtClean="0"/>
-              <a:t>5/5/17</a:t>
+              <a:t>5/6/17</a:t>
             </a:fld>
             <a:endParaRPr lang="en-US"/>
           </a:p>
@@ -467,90 +470,6 @@
 </p:notesMaster>
 </file>
 
-<file path=ppt/notesSlides/notesSlide1.xml><?xml version="1.0" encoding="utf-8"?>
-<p:notes xmlns:a="http://schemas.openxmlformats.org/drawingml/2006/main" xmlns:r="http://schemas.openxmlformats.org/officeDocument/2006/relationships" xmlns:p="http://schemas.openxmlformats.org/presentationml/2006/main">
-  <p:cSld>
-    <p:spTree>
-      <p:nvGrpSpPr>
-        <p:cNvPr id="1" name=""/>
-        <p:cNvGrpSpPr/>
-        <p:nvPr/>
-      </p:nvGrpSpPr>
-      <p:grpSpPr>
-        <a:xfrm>
-          <a:off x="0" y="0"/>
-          <a:ext cx="0" cy="0"/>
-          <a:chOff x="0" y="0"/>
-          <a:chExt cx="0" cy="0"/>
-        </a:xfrm>
-      </p:grpSpPr>
-      <p:sp>
-        <p:nvSpPr>
-          <p:cNvPr id="2" name="Slide Image Placeholder 1"/>
-          <p:cNvSpPr>
-            <a:spLocks noGrp="1" noRot="1" noChangeAspect="1"/>
-          </p:cNvSpPr>
-          <p:nvPr>
-            <p:ph type="sldImg"/>
-          </p:nvPr>
-        </p:nvSpPr>
-        <p:spPr/>
-      </p:sp>
-      <p:sp>
-        <p:nvSpPr>
-          <p:cNvPr id="3" name="Notes Placeholder 2"/>
-          <p:cNvSpPr>
-            <a:spLocks noGrp="1"/>
-          </p:cNvSpPr>
-          <p:nvPr>
-            <p:ph type="body" idx="1"/>
-          </p:nvPr>
-        </p:nvSpPr>
-        <p:spPr/>
-        <p:txBody>
-          <a:bodyPr/>
-          <a:lstStyle/>
-          <a:p>
-            <a:endParaRPr lang="en-US" dirty="0"/>
-          </a:p>
-        </p:txBody>
-      </p:sp>
-      <p:sp>
-        <p:nvSpPr>
-          <p:cNvPr id="4" name="Slide Number Placeholder 3"/>
-          <p:cNvSpPr>
-            <a:spLocks noGrp="1"/>
-          </p:cNvSpPr>
-          <p:nvPr>
-            <p:ph type="sldNum" sz="quarter" idx="10"/>
-          </p:nvPr>
-        </p:nvSpPr>
-        <p:spPr/>
-        <p:txBody>
-          <a:bodyPr/>
-          <a:lstStyle/>
-          <a:p>
-            <a:fld id="{523C15EA-8E3D-D54C-AC1B-471828949BD5}" type="slidenum">
-              <a:rPr lang="en-US" smtClean="0"/>
-              <a:t>6</a:t>
-            </a:fld>
-            <a:endParaRPr lang="en-US"/>
-          </a:p>
-        </p:txBody>
-      </p:sp>
-    </p:spTree>
-    <p:extLst>
-      <p:ext uri="{BB962C8B-B14F-4D97-AF65-F5344CB8AC3E}">
-        <p14:creationId xmlns:p14="http://schemas.microsoft.com/office/powerpoint/2010/main" val="1711582778"/>
-      </p:ext>
-    </p:extLst>
-  </p:cSld>
-  <p:clrMapOvr>
-    <a:masterClrMapping/>
-  </p:clrMapOvr>
-</p:notes>
-</file>
-
 <file path=ppt/slideLayouts/slideLayout1.xml><?xml version="1.0" encoding="utf-8"?>
 <p:sldLayout xmlns:a="http://schemas.openxmlformats.org/drawingml/2006/main" xmlns:r="http://schemas.openxmlformats.org/officeDocument/2006/relationships" xmlns:p="http://schemas.openxmlformats.org/presentationml/2006/main" type="title" preserve="1">
   <p:cSld name="Title Slide">
@@ -732,7 +651,7 @@
           <a:p>
             <a:fld id="{74BC94F0-1A55-1A48-9763-588EC7E1B78D}" type="datetimeFigureOut">
               <a:rPr lang="en-US" smtClean="0"/>
-              <a:t>5/5/17</a:t>
+              <a:t>5/6/17</a:t>
             </a:fld>
             <a:endParaRPr lang="en-US"/>
           </a:p>
@@ -902,7 +821,7 @@
           <a:p>
             <a:fld id="{74BC94F0-1A55-1A48-9763-588EC7E1B78D}" type="datetimeFigureOut">
               <a:rPr lang="en-US" smtClean="0"/>
-              <a:t>5/5/17</a:t>
+              <a:t>5/6/17</a:t>
             </a:fld>
             <a:endParaRPr lang="en-US"/>
           </a:p>
@@ -1082,7 +1001,7 @@
           <a:p>
             <a:fld id="{74BC94F0-1A55-1A48-9763-588EC7E1B78D}" type="datetimeFigureOut">
               <a:rPr lang="en-US" smtClean="0"/>
-              <a:t>5/5/17</a:t>
+              <a:t>5/6/17</a:t>
             </a:fld>
             <a:endParaRPr lang="en-US"/>
           </a:p>
@@ -1252,7 +1171,7 @@
           <a:p>
             <a:fld id="{74BC94F0-1A55-1A48-9763-588EC7E1B78D}" type="datetimeFigureOut">
               <a:rPr lang="en-US" smtClean="0"/>
-              <a:t>5/5/17</a:t>
+              <a:t>5/6/17</a:t>
             </a:fld>
             <a:endParaRPr lang="en-US"/>
           </a:p>
@@ -1498,7 +1417,7 @@
           <a:p>
             <a:fld id="{74BC94F0-1A55-1A48-9763-588EC7E1B78D}" type="datetimeFigureOut">
               <a:rPr lang="en-US" smtClean="0"/>
-              <a:t>5/5/17</a:t>
+              <a:t>5/6/17</a:t>
             </a:fld>
             <a:endParaRPr lang="en-US"/>
           </a:p>
@@ -1786,7 +1705,7 @@
           <a:p>
             <a:fld id="{74BC94F0-1A55-1A48-9763-588EC7E1B78D}" type="datetimeFigureOut">
               <a:rPr lang="en-US" smtClean="0"/>
-              <a:t>5/5/17</a:t>
+              <a:t>5/6/17</a:t>
             </a:fld>
             <a:endParaRPr lang="en-US"/>
           </a:p>
@@ -2208,7 +2127,7 @@
           <a:p>
             <a:fld id="{74BC94F0-1A55-1A48-9763-588EC7E1B78D}" type="datetimeFigureOut">
               <a:rPr lang="en-US" smtClean="0"/>
-              <a:t>5/5/17</a:t>
+              <a:t>5/6/17</a:t>
             </a:fld>
             <a:endParaRPr lang="en-US"/>
           </a:p>
@@ -2326,7 +2245,7 @@
           <a:p>
             <a:fld id="{74BC94F0-1A55-1A48-9763-588EC7E1B78D}" type="datetimeFigureOut">
               <a:rPr lang="en-US" smtClean="0"/>
-              <a:t>5/5/17</a:t>
+              <a:t>5/6/17</a:t>
             </a:fld>
             <a:endParaRPr lang="en-US"/>
           </a:p>
@@ -2421,7 +2340,7 @@
           <a:p>
             <a:fld id="{74BC94F0-1A55-1A48-9763-588EC7E1B78D}" type="datetimeFigureOut">
               <a:rPr lang="en-US" smtClean="0"/>
-              <a:t>5/5/17</a:t>
+              <a:t>5/6/17</a:t>
             </a:fld>
             <a:endParaRPr lang="en-US"/>
           </a:p>
@@ -2698,7 +2617,7 @@
           <a:p>
             <a:fld id="{74BC94F0-1A55-1A48-9763-588EC7E1B78D}" type="datetimeFigureOut">
               <a:rPr lang="en-US" smtClean="0"/>
-              <a:t>5/5/17</a:t>
+              <a:t>5/6/17</a:t>
             </a:fld>
             <a:endParaRPr lang="en-US"/>
           </a:p>
@@ -2951,7 +2870,7 @@
           <a:p>
             <a:fld id="{74BC94F0-1A55-1A48-9763-588EC7E1B78D}" type="datetimeFigureOut">
               <a:rPr lang="en-US" smtClean="0"/>
-              <a:t>5/5/17</a:t>
+              <a:t>5/6/17</a:t>
             </a:fld>
             <a:endParaRPr lang="en-US"/>
           </a:p>
@@ -3164,7 +3083,7 @@
           <a:p>
             <a:fld id="{74BC94F0-1A55-1A48-9763-588EC7E1B78D}" type="datetimeFigureOut">
               <a:rPr lang="en-US" smtClean="0"/>
-              <a:t>5/5/17</a:t>
+              <a:t>5/6/17</a:t>
             </a:fld>
             <a:endParaRPr lang="en-US"/>
           </a:p>
@@ -3659,6 +3578,187 @@
 </p:sld>
 </file>
 
+<file path=ppt/slides/slide10.xml><?xml version="1.0" encoding="utf-8"?>
+<p:sld xmlns:a="http://schemas.openxmlformats.org/drawingml/2006/main" xmlns:r="http://schemas.openxmlformats.org/officeDocument/2006/relationships" xmlns:p="http://schemas.openxmlformats.org/presentationml/2006/main">
+  <p:cSld>
+    <p:spTree>
+      <p:nvGrpSpPr>
+        <p:cNvPr id="1" name=""/>
+        <p:cNvGrpSpPr/>
+        <p:nvPr/>
+      </p:nvGrpSpPr>
+      <p:grpSpPr>
+        <a:xfrm>
+          <a:off x="0" y="0"/>
+          <a:ext cx="0" cy="0"/>
+          <a:chOff x="0" y="0"/>
+          <a:chExt cx="0" cy="0"/>
+        </a:xfrm>
+      </p:grpSpPr>
+      <p:sp>
+        <p:nvSpPr>
+          <p:cNvPr id="2" name="Title 1"/>
+          <p:cNvSpPr>
+            <a:spLocks noGrp="1"/>
+          </p:cNvSpPr>
+          <p:nvPr>
+            <p:ph type="title"/>
+          </p:nvPr>
+        </p:nvSpPr>
+        <p:spPr/>
+        <p:txBody>
+          <a:bodyPr/>
+          <a:lstStyle/>
+          <a:p>
+            <a:r>
+              <a:rPr lang="en-US" dirty="0">
+                <a:latin typeface="Palatino"/>
+                <a:cs typeface="Palatino"/>
+              </a:rPr>
+              <a:t>Evaluation - </a:t>
+            </a:r>
+            <a:r>
+              <a:rPr lang="en-US" dirty="0" smtClean="0">
+                <a:latin typeface="Palatino"/>
+                <a:cs typeface="Palatino"/>
+              </a:rPr>
+              <a:t>Interpretation</a:t>
+            </a:r>
+            <a:endParaRPr lang="en-US" dirty="0"/>
+          </a:p>
+        </p:txBody>
+      </p:sp>
+      <p:sp>
+        <p:nvSpPr>
+          <p:cNvPr id="3" name="Content Placeholder 2"/>
+          <p:cNvSpPr>
+            <a:spLocks noGrp="1"/>
+          </p:cNvSpPr>
+          <p:nvPr>
+            <p:ph idx="1"/>
+          </p:nvPr>
+        </p:nvSpPr>
+        <p:spPr/>
+        <p:txBody>
+          <a:bodyPr/>
+          <a:lstStyle/>
+          <a:p>
+            <a:r>
+              <a:rPr lang="en-US" dirty="0" smtClean="0">
+                <a:latin typeface="Palatino"/>
+                <a:cs typeface="Palatino"/>
+              </a:rPr>
+              <a:t>NOTHING IS REAL HOW IS ANY OF THIS POSSIBLE </a:t>
+            </a:r>
+            <a:endParaRPr lang="en-US" dirty="0">
+              <a:latin typeface="Palatino"/>
+              <a:cs typeface="Palatino"/>
+            </a:endParaRPr>
+          </a:p>
+        </p:txBody>
+      </p:sp>
+    </p:spTree>
+    <p:extLst>
+      <p:ext uri="{BB962C8B-B14F-4D97-AF65-F5344CB8AC3E}">
+        <p14:creationId xmlns:p14="http://schemas.microsoft.com/office/powerpoint/2010/main" val="981060154"/>
+      </p:ext>
+    </p:extLst>
+  </p:cSld>
+  <p:clrMapOvr>
+    <a:masterClrMapping/>
+  </p:clrMapOvr>
+</p:sld>
+</file>
+
+<file path=ppt/slides/slide11.xml><?xml version="1.0" encoding="utf-8"?>
+<p:sld xmlns:a="http://schemas.openxmlformats.org/drawingml/2006/main" xmlns:r="http://schemas.openxmlformats.org/officeDocument/2006/relationships" xmlns:p="http://schemas.openxmlformats.org/presentationml/2006/main">
+  <p:cSld>
+    <p:spTree>
+      <p:nvGrpSpPr>
+        <p:cNvPr id="1" name=""/>
+        <p:cNvGrpSpPr/>
+        <p:nvPr/>
+      </p:nvGrpSpPr>
+      <p:grpSpPr>
+        <a:xfrm>
+          <a:off x="0" y="0"/>
+          <a:ext cx="0" cy="0"/>
+          <a:chOff x="0" y="0"/>
+          <a:chExt cx="0" cy="0"/>
+        </a:xfrm>
+      </p:grpSpPr>
+      <p:sp>
+        <p:nvSpPr>
+          <p:cNvPr id="2" name="Title 1"/>
+          <p:cNvSpPr>
+            <a:spLocks noGrp="1"/>
+          </p:cNvSpPr>
+          <p:nvPr>
+            <p:ph type="title"/>
+          </p:nvPr>
+        </p:nvSpPr>
+        <p:spPr/>
+        <p:txBody>
+          <a:bodyPr/>
+          <a:lstStyle/>
+          <a:p>
+            <a:r>
+              <a:rPr lang="en-US" dirty="0" smtClean="0">
+                <a:latin typeface="Palatino"/>
+                <a:cs typeface="Palatino"/>
+              </a:rPr>
+              <a:t>Summary</a:t>
+            </a:r>
+            <a:endParaRPr lang="en-US" dirty="0">
+              <a:latin typeface="Palatino"/>
+              <a:cs typeface="Palatino"/>
+            </a:endParaRPr>
+          </a:p>
+        </p:txBody>
+      </p:sp>
+      <p:sp>
+        <p:nvSpPr>
+          <p:cNvPr id="3" name="Content Placeholder 2"/>
+          <p:cNvSpPr>
+            <a:spLocks noGrp="1"/>
+          </p:cNvSpPr>
+          <p:nvPr>
+            <p:ph idx="1"/>
+          </p:nvPr>
+        </p:nvSpPr>
+        <p:spPr/>
+        <p:txBody>
+          <a:bodyPr/>
+          <a:lstStyle/>
+          <a:p>
+            <a:r>
+              <a:rPr lang="en-US" dirty="0" smtClean="0">
+                <a:latin typeface="Palatino"/>
+                <a:cs typeface="Palatino"/>
+                <a:sym typeface="Wingdings"/>
+              </a:rPr>
+              <a:t> </a:t>
+            </a:r>
+            <a:endParaRPr lang="en-US" dirty="0">
+              <a:latin typeface="Palatino"/>
+              <a:cs typeface="Palatino"/>
+            </a:endParaRPr>
+          </a:p>
+        </p:txBody>
+      </p:sp>
+    </p:spTree>
+    <p:extLst>
+      <p:ext uri="{BB962C8B-B14F-4D97-AF65-F5344CB8AC3E}">
+        <p14:creationId xmlns:p14="http://schemas.microsoft.com/office/powerpoint/2010/main" val="2484821231"/>
+      </p:ext>
+    </p:extLst>
+  </p:cSld>
+  <p:clrMapOvr>
+    <a:masterClrMapping/>
+  </p:clrMapOvr>
+</p:sld>
+</file>
+
 <file path=ppt/slides/slide2.xml><?xml version="1.0" encoding="utf-8"?>
 <p:sld xmlns:a="http://schemas.openxmlformats.org/drawingml/2006/main" xmlns:r="http://schemas.openxmlformats.org/officeDocument/2006/relationships" xmlns:p="http://schemas.openxmlformats.org/presentationml/2006/main">
   <p:cSld>
@@ -3696,7 +3796,7 @@
                 <a:latin typeface="Palatino"/>
                 <a:cs typeface="Palatino"/>
               </a:rPr>
-              <a:t>System Overview</a:t>
+              <a:t>Conway’s Game of Life</a:t>
             </a:r>
             <a:endParaRPr lang="en-US" dirty="0">
               <a:latin typeface="Palatino"/>
@@ -3725,7 +3825,14 @@
                 <a:latin typeface="Palatino"/>
                 <a:cs typeface="Palatino"/>
               </a:rPr>
-              <a:t>pa</a:t>
+              <a:t>[screenshot of our thing, run </a:t>
+            </a:r>
+            <a:r>
+              <a:rPr lang="en-US" smtClean="0">
+                <a:latin typeface="Palatino"/>
+                <a:cs typeface="Palatino"/>
+              </a:rPr>
+              <a:t>a live simulation?]</a:t>
             </a:r>
             <a:endParaRPr lang="en-US" dirty="0">
               <a:latin typeface="Palatino"/>
@@ -3737,7 +3844,7 @@
     </p:spTree>
     <p:extLst>
       <p:ext uri="{BB962C8B-B14F-4D97-AF65-F5344CB8AC3E}">
-        <p14:creationId xmlns:p14="http://schemas.microsoft.com/office/powerpoint/2010/main" val="1754476318"/>
+        <p14:creationId xmlns:p14="http://schemas.microsoft.com/office/powerpoint/2010/main" val="1528084846"/>
       </p:ext>
     </p:extLst>
   </p:cSld>
@@ -3776,49 +3883,2105 @@
         </p:nvSpPr>
         <p:spPr/>
         <p:txBody>
-          <a:bodyPr/>
+          <a:bodyPr>
+            <a:normAutofit/>
+          </a:bodyPr>
           <a:lstStyle/>
           <a:p>
+            <a:r>
+              <a:rPr lang="en-US" dirty="0">
+                <a:latin typeface="Palatino"/>
+                <a:cs typeface="Palatino"/>
+              </a:rPr>
+              <a:t>Conway’s </a:t>
+            </a:r>
             <a:r>
               <a:rPr lang="en-US" dirty="0" smtClean="0">
                 <a:latin typeface="Palatino"/>
                 <a:cs typeface="Palatino"/>
               </a:rPr>
-              <a:t>High-Level Design</a:t>
-            </a:r>
-            <a:endParaRPr lang="en-US" dirty="0">
-              <a:latin typeface="Palatino"/>
-              <a:cs typeface="Palatino"/>
-            </a:endParaRPr>
-          </a:p>
-        </p:txBody>
-      </p:sp>
-      <p:sp>
-        <p:nvSpPr>
-          <p:cNvPr id="3" name="Content Placeholder 2"/>
-          <p:cNvSpPr>
-            <a:spLocks noGrp="1"/>
-          </p:cNvSpPr>
+              <a:t>Algorithm</a:t>
+            </a:r>
+            <a:endParaRPr lang="en-US" dirty="0"/>
+          </a:p>
+        </p:txBody>
+      </p:sp>
+      <p:graphicFrame>
+        <p:nvGraphicFramePr>
+          <p:cNvPr id="4" name="Content Placeholder 3"/>
+          <p:cNvGraphicFramePr>
+            <a:graphicFrameLocks noGrp="1"/>
+          </p:cNvGraphicFramePr>
           <p:nvPr>
             <p:ph idx="1"/>
           </p:nvPr>
-        </p:nvSpPr>
-        <p:spPr/>
-        <p:txBody>
-          <a:bodyPr/>
-          <a:lstStyle/>
-          <a:p>
-            <a:endParaRPr lang="en-US" dirty="0">
-              <a:latin typeface="Palatino"/>
-              <a:cs typeface="Palatino"/>
-            </a:endParaRPr>
-          </a:p>
-        </p:txBody>
-      </p:sp>
+        </p:nvGraphicFramePr>
+        <p:xfrm>
+          <a:off x="857250" y="2288381"/>
+          <a:ext cx="7429500" cy="3149600"/>
+        </p:xfrm>
+        <a:graphic>
+          <a:graphicData uri="http://schemas.openxmlformats.org/drawingml/2006/table">
+            <a:tbl>
+              <a:tblPr/>
+              <a:tblGrid>
+                <a:gridCol w="825500"/>
+                <a:gridCol w="825500"/>
+                <a:gridCol w="825500"/>
+                <a:gridCol w="825500"/>
+                <a:gridCol w="825500"/>
+                <a:gridCol w="825500"/>
+                <a:gridCol w="825500"/>
+                <a:gridCol w="825500"/>
+                <a:gridCol w="825500"/>
+              </a:tblGrid>
+              <a:tr h="787400">
+                <a:tc>
+                  <a:txBody>
+                    <a:bodyPr/>
+                    <a:lstStyle/>
+                    <a:p>
+                      <a:pPr algn="ctr" fontAlgn="ctr"/>
+                      <a:r>
+                        <a:rPr lang="en-US" sz="1800" b="0" i="0" u="none" strike="noStrike">
+                          <a:solidFill>
+                            <a:srgbClr val="000000"/>
+                          </a:solidFill>
+                          <a:effectLst/>
+                          <a:latin typeface="Palatino"/>
+                        </a:rPr>
+                        <a:t>0</a:t>
+                      </a:r>
+                    </a:p>
+                  </a:txBody>
+                  <a:tcPr marL="12700" marR="12700" marT="12700" marB="0" anchor="ctr">
+                    <a:lnL w="12700" cap="flat" cmpd="sng" algn="ctr">
+                      <a:solidFill>
+                        <a:srgbClr val="000000"/>
+                      </a:solidFill>
+                      <a:prstDash val="solid"/>
+                      <a:round/>
+                      <a:headEnd type="none" w="med" len="med"/>
+                      <a:tailEnd type="none" w="med" len="med"/>
+                    </a:lnL>
+                    <a:lnR w="6350" cap="flat" cmpd="sng" algn="ctr">
+                      <a:solidFill>
+                        <a:srgbClr val="000000"/>
+                      </a:solidFill>
+                      <a:prstDash val="solid"/>
+                      <a:round/>
+                      <a:headEnd type="none" w="med" len="med"/>
+                      <a:tailEnd type="none" w="med" len="med"/>
+                    </a:lnR>
+                    <a:lnT w="12700" cap="flat" cmpd="sng" algn="ctr">
+                      <a:solidFill>
+                        <a:srgbClr val="000000"/>
+                      </a:solidFill>
+                      <a:prstDash val="solid"/>
+                      <a:round/>
+                      <a:headEnd type="none" w="med" len="med"/>
+                      <a:tailEnd type="none" w="med" len="med"/>
+                    </a:lnT>
+                    <a:lnB w="6350" cap="flat" cmpd="sng" algn="ctr">
+                      <a:solidFill>
+                        <a:srgbClr val="000000"/>
+                      </a:solidFill>
+                      <a:prstDash val="solid"/>
+                      <a:round/>
+                      <a:headEnd type="none" w="med" len="med"/>
+                      <a:tailEnd type="none" w="med" len="med"/>
+                    </a:lnB>
+                  </a:tcPr>
+                </a:tc>
+                <a:tc>
+                  <a:txBody>
+                    <a:bodyPr/>
+                    <a:lstStyle/>
+                    <a:p>
+                      <a:pPr algn="ctr" fontAlgn="ctr"/>
+                      <a:r>
+                        <a:rPr lang="en-US" sz="1800" b="0" i="0" u="none" strike="noStrike">
+                          <a:solidFill>
+                            <a:srgbClr val="000000"/>
+                          </a:solidFill>
+                          <a:effectLst/>
+                          <a:latin typeface="Palatino"/>
+                        </a:rPr>
+                        <a:t>0</a:t>
+                      </a:r>
+                    </a:p>
+                  </a:txBody>
+                  <a:tcPr marL="12700" marR="12700" marT="12700" marB="0" anchor="ctr">
+                    <a:lnL w="6350" cap="flat" cmpd="sng" algn="ctr">
+                      <a:solidFill>
+                        <a:srgbClr val="000000"/>
+                      </a:solidFill>
+                      <a:prstDash val="solid"/>
+                      <a:round/>
+                      <a:headEnd type="none" w="med" len="med"/>
+                      <a:tailEnd type="none" w="med" len="med"/>
+                    </a:lnL>
+                    <a:lnR w="6350" cap="flat" cmpd="sng" algn="ctr">
+                      <a:solidFill>
+                        <a:srgbClr val="000000"/>
+                      </a:solidFill>
+                      <a:prstDash val="solid"/>
+                      <a:round/>
+                      <a:headEnd type="none" w="med" len="med"/>
+                      <a:tailEnd type="none" w="med" len="med"/>
+                    </a:lnR>
+                    <a:lnT w="12700" cap="flat" cmpd="sng" algn="ctr">
+                      <a:solidFill>
+                        <a:srgbClr val="000000"/>
+                      </a:solidFill>
+                      <a:prstDash val="solid"/>
+                      <a:round/>
+                      <a:headEnd type="none" w="med" len="med"/>
+                      <a:tailEnd type="none" w="med" len="med"/>
+                    </a:lnT>
+                    <a:lnB w="6350" cap="flat" cmpd="sng" algn="ctr">
+                      <a:solidFill>
+                        <a:srgbClr val="000000"/>
+                      </a:solidFill>
+                      <a:prstDash val="solid"/>
+                      <a:round/>
+                      <a:headEnd type="none" w="med" len="med"/>
+                      <a:tailEnd type="none" w="med" len="med"/>
+                    </a:lnB>
+                  </a:tcPr>
+                </a:tc>
+                <a:tc>
+                  <a:txBody>
+                    <a:bodyPr/>
+                    <a:lstStyle/>
+                    <a:p>
+                      <a:pPr algn="ctr" fontAlgn="ctr"/>
+                      <a:r>
+                        <a:rPr lang="is-IS" sz="1800" b="0" i="0" u="none" strike="noStrike">
+                          <a:solidFill>
+                            <a:srgbClr val="000000"/>
+                          </a:solidFill>
+                          <a:effectLst/>
+                          <a:latin typeface="Palatino"/>
+                        </a:rPr>
+                        <a:t>2</a:t>
+                      </a:r>
+                    </a:p>
+                  </a:txBody>
+                  <a:tcPr marL="12700" marR="12700" marT="12700" marB="0" anchor="ctr">
+                    <a:lnL w="6350" cap="flat" cmpd="sng" algn="ctr">
+                      <a:solidFill>
+                        <a:srgbClr val="000000"/>
+                      </a:solidFill>
+                      <a:prstDash val="solid"/>
+                      <a:round/>
+                      <a:headEnd type="none" w="med" len="med"/>
+                      <a:tailEnd type="none" w="med" len="med"/>
+                    </a:lnL>
+                    <a:lnR w="6350" cap="flat" cmpd="sng" algn="ctr">
+                      <a:solidFill>
+                        <a:srgbClr val="000000"/>
+                      </a:solidFill>
+                      <a:prstDash val="solid"/>
+                      <a:round/>
+                      <a:headEnd type="none" w="med" len="med"/>
+                      <a:tailEnd type="none" w="med" len="med"/>
+                    </a:lnR>
+                    <a:lnT w="12700" cap="flat" cmpd="sng" algn="ctr">
+                      <a:solidFill>
+                        <a:srgbClr val="000000"/>
+                      </a:solidFill>
+                      <a:prstDash val="solid"/>
+                      <a:round/>
+                      <a:headEnd type="none" w="med" len="med"/>
+                      <a:tailEnd type="none" w="med" len="med"/>
+                    </a:lnT>
+                    <a:lnB w="6350" cap="flat" cmpd="sng" algn="ctr">
+                      <a:solidFill>
+                        <a:srgbClr val="000000"/>
+                      </a:solidFill>
+                      <a:prstDash val="solid"/>
+                      <a:round/>
+                      <a:headEnd type="none" w="med" len="med"/>
+                      <a:tailEnd type="none" w="med" len="med"/>
+                    </a:lnB>
+                  </a:tcPr>
+                </a:tc>
+                <a:tc>
+                  <a:txBody>
+                    <a:bodyPr/>
+                    <a:lstStyle/>
+                    <a:p>
+                      <a:pPr algn="ctr" fontAlgn="ctr"/>
+                      <a:r>
+                        <a:rPr lang="en-US" sz="1800" b="0" i="0" u="none" strike="noStrike">
+                          <a:solidFill>
+                            <a:srgbClr val="000000"/>
+                          </a:solidFill>
+                          <a:effectLst/>
+                          <a:latin typeface="Palatino"/>
+                        </a:rPr>
+                        <a:t>1</a:t>
+                      </a:r>
+                    </a:p>
+                  </a:txBody>
+                  <a:tcPr marL="12700" marR="12700" marT="12700" marB="0" anchor="ctr">
+                    <a:lnL w="6350" cap="flat" cmpd="sng" algn="ctr">
+                      <a:solidFill>
+                        <a:srgbClr val="000000"/>
+                      </a:solidFill>
+                      <a:prstDash val="solid"/>
+                      <a:round/>
+                      <a:headEnd type="none" w="med" len="med"/>
+                      <a:tailEnd type="none" w="med" len="med"/>
+                    </a:lnL>
+                    <a:lnR w="12700" cap="flat" cmpd="sng" algn="ctr">
+                      <a:solidFill>
+                        <a:srgbClr val="000000"/>
+                      </a:solidFill>
+                      <a:prstDash val="solid"/>
+                      <a:round/>
+                      <a:headEnd type="none" w="med" len="med"/>
+                      <a:tailEnd type="none" w="med" len="med"/>
+                    </a:lnR>
+                    <a:lnT w="12700" cap="flat" cmpd="sng" algn="ctr">
+                      <a:solidFill>
+                        <a:srgbClr val="000000"/>
+                      </a:solidFill>
+                      <a:prstDash val="solid"/>
+                      <a:round/>
+                      <a:headEnd type="none" w="med" len="med"/>
+                      <a:tailEnd type="none" w="med" len="med"/>
+                    </a:lnT>
+                    <a:lnB w="6350" cap="flat" cmpd="sng" algn="ctr">
+                      <a:solidFill>
+                        <a:srgbClr val="000000"/>
+                      </a:solidFill>
+                      <a:prstDash val="solid"/>
+                      <a:round/>
+                      <a:headEnd type="none" w="med" len="med"/>
+                      <a:tailEnd type="none" w="med" len="med"/>
+                    </a:lnB>
+                    <a:solidFill>
+                      <a:srgbClr val="BFBFBF"/>
+                    </a:solidFill>
+                  </a:tcPr>
+                </a:tc>
+                <a:tc>
+                  <a:txBody>
+                    <a:bodyPr/>
+                    <a:lstStyle/>
+                    <a:p>
+                      <a:pPr algn="l" fontAlgn="b"/>
+                      <a:endParaRPr lang="en-US" sz="1200" b="0" i="0" u="none" strike="noStrike">
+                        <a:solidFill>
+                          <a:srgbClr val="000000"/>
+                        </a:solidFill>
+                        <a:effectLst/>
+                        <a:latin typeface="Calibri"/>
+                      </a:endParaRPr>
+                    </a:p>
+                  </a:txBody>
+                  <a:tcPr marL="12700" marR="12700" marT="12700" marB="0" anchor="b">
+                    <a:lnL w="12700" cap="flat" cmpd="sng" algn="ctr">
+                      <a:solidFill>
+                        <a:srgbClr val="000000"/>
+                      </a:solidFill>
+                      <a:prstDash val="solid"/>
+                      <a:round/>
+                      <a:headEnd type="none" w="med" len="med"/>
+                      <a:tailEnd type="none" w="med" len="med"/>
+                    </a:lnL>
+                    <a:lnR w="12700" cap="flat" cmpd="sng" algn="ctr">
+                      <a:solidFill>
+                        <a:srgbClr val="000000"/>
+                      </a:solidFill>
+                      <a:prstDash val="solid"/>
+                      <a:round/>
+                      <a:headEnd type="none" w="med" len="med"/>
+                      <a:tailEnd type="none" w="med" len="med"/>
+                    </a:lnR>
+                    <a:lnT>
+                      <a:noFill/>
+                    </a:lnT>
+                    <a:lnB>
+                      <a:noFill/>
+                    </a:lnB>
+                  </a:tcPr>
+                </a:tc>
+                <a:tc>
+                  <a:txBody>
+                    <a:bodyPr/>
+                    <a:lstStyle/>
+                    <a:p>
+                      <a:pPr algn="ctr" fontAlgn="ctr"/>
+                      <a:r>
+                        <a:rPr lang="en-US" sz="1800" b="0" i="0" u="none" strike="noStrike">
+                          <a:solidFill>
+                            <a:srgbClr val="000000"/>
+                          </a:solidFill>
+                          <a:effectLst/>
+                          <a:latin typeface="Palatino"/>
+                        </a:rPr>
+                        <a:t>0</a:t>
+                      </a:r>
+                    </a:p>
+                  </a:txBody>
+                  <a:tcPr marL="12700" marR="12700" marT="12700" marB="0" anchor="ctr">
+                    <a:lnL w="12700" cap="flat" cmpd="sng" algn="ctr">
+                      <a:solidFill>
+                        <a:srgbClr val="000000"/>
+                      </a:solidFill>
+                      <a:prstDash val="solid"/>
+                      <a:round/>
+                      <a:headEnd type="none" w="med" len="med"/>
+                      <a:tailEnd type="none" w="med" len="med"/>
+                    </a:lnL>
+                    <a:lnR w="6350" cap="flat" cmpd="sng" algn="ctr">
+                      <a:solidFill>
+                        <a:srgbClr val="000000"/>
+                      </a:solidFill>
+                      <a:prstDash val="solid"/>
+                      <a:round/>
+                      <a:headEnd type="none" w="med" len="med"/>
+                      <a:tailEnd type="none" w="med" len="med"/>
+                    </a:lnR>
+                    <a:lnT w="12700" cap="flat" cmpd="sng" algn="ctr">
+                      <a:solidFill>
+                        <a:srgbClr val="000000"/>
+                      </a:solidFill>
+                      <a:prstDash val="solid"/>
+                      <a:round/>
+                      <a:headEnd type="none" w="med" len="med"/>
+                      <a:tailEnd type="none" w="med" len="med"/>
+                    </a:lnT>
+                    <a:lnB w="6350" cap="flat" cmpd="sng" algn="ctr">
+                      <a:solidFill>
+                        <a:srgbClr val="000000"/>
+                      </a:solidFill>
+                      <a:prstDash val="solid"/>
+                      <a:round/>
+                      <a:headEnd type="none" w="med" len="med"/>
+                      <a:tailEnd type="none" w="med" len="med"/>
+                    </a:lnB>
+                  </a:tcPr>
+                </a:tc>
+                <a:tc>
+                  <a:txBody>
+                    <a:bodyPr/>
+                    <a:lstStyle/>
+                    <a:p>
+                      <a:pPr algn="ctr" fontAlgn="ctr"/>
+                      <a:r>
+                        <a:rPr lang="en-US" sz="1800" b="0" i="0" u="none" strike="noStrike">
+                          <a:solidFill>
+                            <a:srgbClr val="000000"/>
+                          </a:solidFill>
+                          <a:effectLst/>
+                          <a:latin typeface="Palatino"/>
+                        </a:rPr>
+                        <a:t>0</a:t>
+                      </a:r>
+                    </a:p>
+                  </a:txBody>
+                  <a:tcPr marL="12700" marR="12700" marT="12700" marB="0" anchor="ctr">
+                    <a:lnL w="6350" cap="flat" cmpd="sng" algn="ctr">
+                      <a:solidFill>
+                        <a:srgbClr val="000000"/>
+                      </a:solidFill>
+                      <a:prstDash val="solid"/>
+                      <a:round/>
+                      <a:headEnd type="none" w="med" len="med"/>
+                      <a:tailEnd type="none" w="med" len="med"/>
+                    </a:lnL>
+                    <a:lnR w="6350" cap="flat" cmpd="sng" algn="ctr">
+                      <a:solidFill>
+                        <a:srgbClr val="000000"/>
+                      </a:solidFill>
+                      <a:prstDash val="solid"/>
+                      <a:round/>
+                      <a:headEnd type="none" w="med" len="med"/>
+                      <a:tailEnd type="none" w="med" len="med"/>
+                    </a:lnR>
+                    <a:lnT w="12700" cap="flat" cmpd="sng" algn="ctr">
+                      <a:solidFill>
+                        <a:srgbClr val="000000"/>
+                      </a:solidFill>
+                      <a:prstDash val="solid"/>
+                      <a:round/>
+                      <a:headEnd type="none" w="med" len="med"/>
+                      <a:tailEnd type="none" w="med" len="med"/>
+                    </a:lnT>
+                    <a:lnB w="6350" cap="flat" cmpd="sng" algn="ctr">
+                      <a:solidFill>
+                        <a:srgbClr val="000000"/>
+                      </a:solidFill>
+                      <a:prstDash val="solid"/>
+                      <a:round/>
+                      <a:headEnd type="none" w="med" len="med"/>
+                      <a:tailEnd type="none" w="med" len="med"/>
+                    </a:lnB>
+                  </a:tcPr>
+                </a:tc>
+                <a:tc>
+                  <a:txBody>
+                    <a:bodyPr/>
+                    <a:lstStyle/>
+                    <a:p>
+                      <a:pPr algn="ctr" fontAlgn="ctr"/>
+                      <a:r>
+                        <a:rPr lang="is-IS" sz="1800" b="0" i="0" u="none" strike="noStrike">
+                          <a:solidFill>
+                            <a:srgbClr val="000000"/>
+                          </a:solidFill>
+                          <a:effectLst/>
+                          <a:latin typeface="Palatino"/>
+                        </a:rPr>
+                        <a:t>2</a:t>
+                      </a:r>
+                    </a:p>
+                  </a:txBody>
+                  <a:tcPr marL="12700" marR="12700" marT="12700" marB="0" anchor="ctr">
+                    <a:lnL w="6350" cap="flat" cmpd="sng" algn="ctr">
+                      <a:solidFill>
+                        <a:srgbClr val="000000"/>
+                      </a:solidFill>
+                      <a:prstDash val="solid"/>
+                      <a:round/>
+                      <a:headEnd type="none" w="med" len="med"/>
+                      <a:tailEnd type="none" w="med" len="med"/>
+                    </a:lnL>
+                    <a:lnR w="6350" cap="flat" cmpd="sng" algn="ctr">
+                      <a:solidFill>
+                        <a:srgbClr val="000000"/>
+                      </a:solidFill>
+                      <a:prstDash val="solid"/>
+                      <a:round/>
+                      <a:headEnd type="none" w="med" len="med"/>
+                      <a:tailEnd type="none" w="med" len="med"/>
+                    </a:lnR>
+                    <a:lnT w="12700" cap="flat" cmpd="sng" algn="ctr">
+                      <a:solidFill>
+                        <a:srgbClr val="000000"/>
+                      </a:solidFill>
+                      <a:prstDash val="solid"/>
+                      <a:round/>
+                      <a:headEnd type="none" w="med" len="med"/>
+                      <a:tailEnd type="none" w="med" len="med"/>
+                    </a:lnT>
+                    <a:lnB w="6350" cap="flat" cmpd="sng" algn="ctr">
+                      <a:solidFill>
+                        <a:srgbClr val="000000"/>
+                      </a:solidFill>
+                      <a:prstDash val="solid"/>
+                      <a:round/>
+                      <a:headEnd type="none" w="med" len="med"/>
+                      <a:tailEnd type="none" w="med" len="med"/>
+                    </a:lnB>
+                  </a:tcPr>
+                </a:tc>
+                <a:tc>
+                  <a:txBody>
+                    <a:bodyPr/>
+                    <a:lstStyle/>
+                    <a:p>
+                      <a:pPr algn="ctr" fontAlgn="ctr"/>
+                      <a:r>
+                        <a:rPr lang="en-US" sz="1800" b="0" i="0" u="none" strike="noStrike">
+                          <a:solidFill>
+                            <a:srgbClr val="000000"/>
+                          </a:solidFill>
+                          <a:effectLst/>
+                          <a:latin typeface="Palatino"/>
+                        </a:rPr>
+                        <a:t>1</a:t>
+                      </a:r>
+                    </a:p>
+                  </a:txBody>
+                  <a:tcPr marL="12700" marR="12700" marT="12700" marB="0" anchor="ctr">
+                    <a:lnL w="6350" cap="flat" cmpd="sng" algn="ctr">
+                      <a:solidFill>
+                        <a:srgbClr val="000000"/>
+                      </a:solidFill>
+                      <a:prstDash val="solid"/>
+                      <a:round/>
+                      <a:headEnd type="none" w="med" len="med"/>
+                      <a:tailEnd type="none" w="med" len="med"/>
+                    </a:lnL>
+                    <a:lnR w="12700" cap="flat" cmpd="sng" algn="ctr">
+                      <a:solidFill>
+                        <a:srgbClr val="000000"/>
+                      </a:solidFill>
+                      <a:prstDash val="solid"/>
+                      <a:round/>
+                      <a:headEnd type="none" w="med" len="med"/>
+                      <a:tailEnd type="none" w="med" len="med"/>
+                    </a:lnR>
+                    <a:lnT w="12700" cap="flat" cmpd="sng" algn="ctr">
+                      <a:solidFill>
+                        <a:srgbClr val="000000"/>
+                      </a:solidFill>
+                      <a:prstDash val="solid"/>
+                      <a:round/>
+                      <a:headEnd type="none" w="med" len="med"/>
+                      <a:tailEnd type="none" w="med" len="med"/>
+                    </a:lnT>
+                    <a:lnB w="6350" cap="flat" cmpd="sng" algn="ctr">
+                      <a:solidFill>
+                        <a:srgbClr val="000000"/>
+                      </a:solidFill>
+                      <a:prstDash val="solid"/>
+                      <a:round/>
+                      <a:headEnd type="none" w="med" len="med"/>
+                      <a:tailEnd type="none" w="med" len="med"/>
+                    </a:lnB>
+                  </a:tcPr>
+                </a:tc>
+              </a:tr>
+              <a:tr h="787400">
+                <a:tc>
+                  <a:txBody>
+                    <a:bodyPr/>
+                    <a:lstStyle/>
+                    <a:p>
+                      <a:pPr algn="ctr" fontAlgn="ctr"/>
+                      <a:r>
+                        <a:rPr lang="is-IS" sz="1800" b="0" i="0" u="none" strike="noStrike">
+                          <a:solidFill>
+                            <a:srgbClr val="000000"/>
+                          </a:solidFill>
+                          <a:effectLst/>
+                          <a:latin typeface="Palatino"/>
+                        </a:rPr>
+                        <a:t>2</a:t>
+                      </a:r>
+                    </a:p>
+                  </a:txBody>
+                  <a:tcPr marL="12700" marR="12700" marT="12700" marB="0" anchor="ctr">
+                    <a:lnL w="12700" cap="flat" cmpd="sng" algn="ctr">
+                      <a:solidFill>
+                        <a:srgbClr val="000000"/>
+                      </a:solidFill>
+                      <a:prstDash val="solid"/>
+                      <a:round/>
+                      <a:headEnd type="none" w="med" len="med"/>
+                      <a:tailEnd type="none" w="med" len="med"/>
+                    </a:lnL>
+                    <a:lnR w="6350" cap="flat" cmpd="sng" algn="ctr">
+                      <a:solidFill>
+                        <a:srgbClr val="000000"/>
+                      </a:solidFill>
+                      <a:prstDash val="solid"/>
+                      <a:round/>
+                      <a:headEnd type="none" w="med" len="med"/>
+                      <a:tailEnd type="none" w="med" len="med"/>
+                    </a:lnR>
+                    <a:lnT w="6350" cap="flat" cmpd="sng" algn="ctr">
+                      <a:solidFill>
+                        <a:srgbClr val="000000"/>
+                      </a:solidFill>
+                      <a:prstDash val="solid"/>
+                      <a:round/>
+                      <a:headEnd type="none" w="med" len="med"/>
+                      <a:tailEnd type="none" w="med" len="med"/>
+                    </a:lnT>
+                    <a:lnB w="6350" cap="flat" cmpd="sng" algn="ctr">
+                      <a:solidFill>
+                        <a:srgbClr val="000000"/>
+                      </a:solidFill>
+                      <a:prstDash val="solid"/>
+                      <a:round/>
+                      <a:headEnd type="none" w="med" len="med"/>
+                      <a:tailEnd type="none" w="med" len="med"/>
+                    </a:lnB>
+                  </a:tcPr>
+                </a:tc>
+                <a:tc>
+                  <a:txBody>
+                    <a:bodyPr/>
+                    <a:lstStyle/>
+                    <a:p>
+                      <a:pPr algn="ctr" fontAlgn="ctr"/>
+                      <a:r>
+                        <a:rPr lang="en-US" sz="1800" b="0" i="0" u="none" strike="noStrike">
+                          <a:solidFill>
+                            <a:srgbClr val="000000"/>
+                          </a:solidFill>
+                          <a:effectLst/>
+                          <a:latin typeface="Palatino"/>
+                        </a:rPr>
+                        <a:t>3</a:t>
+                      </a:r>
+                    </a:p>
+                  </a:txBody>
+                  <a:tcPr marL="12700" marR="12700" marT="12700" marB="0" anchor="ctr">
+                    <a:lnL w="6350" cap="flat" cmpd="sng" algn="ctr">
+                      <a:solidFill>
+                        <a:srgbClr val="000000"/>
+                      </a:solidFill>
+                      <a:prstDash val="solid"/>
+                      <a:round/>
+                      <a:headEnd type="none" w="med" len="med"/>
+                      <a:tailEnd type="none" w="med" len="med"/>
+                    </a:lnL>
+                    <a:lnR w="6350" cap="flat" cmpd="sng" algn="ctr">
+                      <a:solidFill>
+                        <a:srgbClr val="000000"/>
+                      </a:solidFill>
+                      <a:prstDash val="solid"/>
+                      <a:round/>
+                      <a:headEnd type="none" w="med" len="med"/>
+                      <a:tailEnd type="none" w="med" len="med"/>
+                    </a:lnR>
+                    <a:lnT w="6350" cap="flat" cmpd="sng" algn="ctr">
+                      <a:solidFill>
+                        <a:srgbClr val="000000"/>
+                      </a:solidFill>
+                      <a:prstDash val="solid"/>
+                      <a:round/>
+                      <a:headEnd type="none" w="med" len="med"/>
+                      <a:tailEnd type="none" w="med" len="med"/>
+                    </a:lnT>
+                    <a:lnB w="6350" cap="flat" cmpd="sng" algn="ctr">
+                      <a:solidFill>
+                        <a:srgbClr val="000000"/>
+                      </a:solidFill>
+                      <a:prstDash val="solid"/>
+                      <a:round/>
+                      <a:headEnd type="none" w="med" len="med"/>
+                      <a:tailEnd type="none" w="med" len="med"/>
+                    </a:lnB>
+                  </a:tcPr>
+                </a:tc>
+                <a:tc>
+                  <a:txBody>
+                    <a:bodyPr/>
+                    <a:lstStyle/>
+                    <a:p>
+                      <a:pPr algn="ctr" fontAlgn="ctr"/>
+                      <a:r>
+                        <a:rPr lang="en-US" sz="1800" b="0" i="0" u="none" strike="noStrike">
+                          <a:solidFill>
+                            <a:srgbClr val="000000"/>
+                          </a:solidFill>
+                          <a:effectLst/>
+                          <a:latin typeface="Palatino"/>
+                        </a:rPr>
+                        <a:t>4</a:t>
+                      </a:r>
+                    </a:p>
+                  </a:txBody>
+                  <a:tcPr marL="12700" marR="12700" marT="12700" marB="0" anchor="ctr">
+                    <a:lnL w="6350" cap="flat" cmpd="sng" algn="ctr">
+                      <a:solidFill>
+                        <a:srgbClr val="000000"/>
+                      </a:solidFill>
+                      <a:prstDash val="solid"/>
+                      <a:round/>
+                      <a:headEnd type="none" w="med" len="med"/>
+                      <a:tailEnd type="none" w="med" len="med"/>
+                    </a:lnL>
+                    <a:lnR w="6350" cap="flat" cmpd="sng" algn="ctr">
+                      <a:solidFill>
+                        <a:srgbClr val="000000"/>
+                      </a:solidFill>
+                      <a:prstDash val="solid"/>
+                      <a:round/>
+                      <a:headEnd type="none" w="med" len="med"/>
+                      <a:tailEnd type="none" w="med" len="med"/>
+                    </a:lnR>
+                    <a:lnT w="6350" cap="flat" cmpd="sng" algn="ctr">
+                      <a:solidFill>
+                        <a:srgbClr val="000000"/>
+                      </a:solidFill>
+                      <a:prstDash val="solid"/>
+                      <a:round/>
+                      <a:headEnd type="none" w="med" len="med"/>
+                      <a:tailEnd type="none" w="med" len="med"/>
+                    </a:lnT>
+                    <a:lnB w="6350" cap="flat" cmpd="sng" algn="ctr">
+                      <a:solidFill>
+                        <a:srgbClr val="000000"/>
+                      </a:solidFill>
+                      <a:prstDash val="solid"/>
+                      <a:round/>
+                      <a:headEnd type="none" w="med" len="med"/>
+                      <a:tailEnd type="none" w="med" len="med"/>
+                    </a:lnB>
+                  </a:tcPr>
+                </a:tc>
+                <a:tc>
+                  <a:txBody>
+                    <a:bodyPr/>
+                    <a:lstStyle/>
+                    <a:p>
+                      <a:pPr algn="ctr" fontAlgn="ctr"/>
+                      <a:r>
+                        <a:rPr lang="is-IS" sz="1800" b="0" i="0" u="none" strike="noStrike">
+                          <a:solidFill>
+                            <a:srgbClr val="000000"/>
+                          </a:solidFill>
+                          <a:effectLst/>
+                          <a:latin typeface="Palatino"/>
+                        </a:rPr>
+                        <a:t>2</a:t>
+                      </a:r>
+                    </a:p>
+                  </a:txBody>
+                  <a:tcPr marL="12700" marR="12700" marT="12700" marB="0" anchor="ctr">
+                    <a:lnL w="6350" cap="flat" cmpd="sng" algn="ctr">
+                      <a:solidFill>
+                        <a:srgbClr val="000000"/>
+                      </a:solidFill>
+                      <a:prstDash val="solid"/>
+                      <a:round/>
+                      <a:headEnd type="none" w="med" len="med"/>
+                      <a:tailEnd type="none" w="med" len="med"/>
+                    </a:lnL>
+                    <a:lnR w="12700" cap="flat" cmpd="sng" algn="ctr">
+                      <a:solidFill>
+                        <a:srgbClr val="000000"/>
+                      </a:solidFill>
+                      <a:prstDash val="solid"/>
+                      <a:round/>
+                      <a:headEnd type="none" w="med" len="med"/>
+                      <a:tailEnd type="none" w="med" len="med"/>
+                    </a:lnR>
+                    <a:lnT w="6350" cap="flat" cmpd="sng" algn="ctr">
+                      <a:solidFill>
+                        <a:srgbClr val="000000"/>
+                      </a:solidFill>
+                      <a:prstDash val="solid"/>
+                      <a:round/>
+                      <a:headEnd type="none" w="med" len="med"/>
+                      <a:tailEnd type="none" w="med" len="med"/>
+                    </a:lnT>
+                    <a:lnB w="6350" cap="flat" cmpd="sng" algn="ctr">
+                      <a:solidFill>
+                        <a:srgbClr val="000000"/>
+                      </a:solidFill>
+                      <a:prstDash val="solid"/>
+                      <a:round/>
+                      <a:headEnd type="none" w="med" len="med"/>
+                      <a:tailEnd type="none" w="med" len="med"/>
+                    </a:lnB>
+                    <a:solidFill>
+                      <a:srgbClr val="BFBFBF"/>
+                    </a:solidFill>
+                  </a:tcPr>
+                </a:tc>
+                <a:tc>
+                  <a:txBody>
+                    <a:bodyPr/>
+                    <a:lstStyle/>
+                    <a:p>
+                      <a:pPr algn="l" fontAlgn="b"/>
+                      <a:endParaRPr lang="en-US" sz="1200" b="0" i="0" u="none" strike="noStrike">
+                        <a:solidFill>
+                          <a:srgbClr val="000000"/>
+                        </a:solidFill>
+                        <a:effectLst/>
+                        <a:latin typeface="Calibri"/>
+                      </a:endParaRPr>
+                    </a:p>
+                  </a:txBody>
+                  <a:tcPr marL="12700" marR="12700" marT="12700" marB="0" anchor="b">
+                    <a:lnL w="12700" cap="flat" cmpd="sng" algn="ctr">
+                      <a:solidFill>
+                        <a:srgbClr val="000000"/>
+                      </a:solidFill>
+                      <a:prstDash val="solid"/>
+                      <a:round/>
+                      <a:headEnd type="none" w="med" len="med"/>
+                      <a:tailEnd type="none" w="med" len="med"/>
+                    </a:lnL>
+                    <a:lnR w="12700" cap="flat" cmpd="sng" algn="ctr">
+                      <a:solidFill>
+                        <a:srgbClr val="000000"/>
+                      </a:solidFill>
+                      <a:prstDash val="solid"/>
+                      <a:round/>
+                      <a:headEnd type="none" w="med" len="med"/>
+                      <a:tailEnd type="none" w="med" len="med"/>
+                    </a:lnR>
+                    <a:lnT>
+                      <a:noFill/>
+                    </a:lnT>
+                    <a:lnB>
+                      <a:noFill/>
+                    </a:lnB>
+                  </a:tcPr>
+                </a:tc>
+                <a:tc>
+                  <a:txBody>
+                    <a:bodyPr/>
+                    <a:lstStyle/>
+                    <a:p>
+                      <a:pPr algn="ctr" fontAlgn="ctr"/>
+                      <a:r>
+                        <a:rPr lang="is-IS" sz="1800" b="0" i="0" u="none" strike="noStrike">
+                          <a:solidFill>
+                            <a:srgbClr val="000000"/>
+                          </a:solidFill>
+                          <a:effectLst/>
+                          <a:latin typeface="Palatino"/>
+                        </a:rPr>
+                        <a:t>2</a:t>
+                      </a:r>
+                    </a:p>
+                  </a:txBody>
+                  <a:tcPr marL="12700" marR="12700" marT="12700" marB="0" anchor="ctr">
+                    <a:lnL w="12700" cap="flat" cmpd="sng" algn="ctr">
+                      <a:solidFill>
+                        <a:srgbClr val="000000"/>
+                      </a:solidFill>
+                      <a:prstDash val="solid"/>
+                      <a:round/>
+                      <a:headEnd type="none" w="med" len="med"/>
+                      <a:tailEnd type="none" w="med" len="med"/>
+                    </a:lnL>
+                    <a:lnR w="6350" cap="flat" cmpd="sng" algn="ctr">
+                      <a:solidFill>
+                        <a:srgbClr val="000000"/>
+                      </a:solidFill>
+                      <a:prstDash val="solid"/>
+                      <a:round/>
+                      <a:headEnd type="none" w="med" len="med"/>
+                      <a:tailEnd type="none" w="med" len="med"/>
+                    </a:lnR>
+                    <a:lnT w="6350" cap="flat" cmpd="sng" algn="ctr">
+                      <a:solidFill>
+                        <a:srgbClr val="000000"/>
+                      </a:solidFill>
+                      <a:prstDash val="solid"/>
+                      <a:round/>
+                      <a:headEnd type="none" w="med" len="med"/>
+                      <a:tailEnd type="none" w="med" len="med"/>
+                    </a:lnT>
+                    <a:lnB w="6350" cap="flat" cmpd="sng" algn="ctr">
+                      <a:solidFill>
+                        <a:srgbClr val="000000"/>
+                      </a:solidFill>
+                      <a:prstDash val="solid"/>
+                      <a:round/>
+                      <a:headEnd type="none" w="med" len="med"/>
+                      <a:tailEnd type="none" w="med" len="med"/>
+                    </a:lnB>
+                  </a:tcPr>
+                </a:tc>
+                <a:tc>
+                  <a:txBody>
+                    <a:bodyPr/>
+                    <a:lstStyle/>
+                    <a:p>
+                      <a:pPr algn="ctr" fontAlgn="ctr"/>
+                      <a:r>
+                        <a:rPr lang="en-US" sz="1800" b="0" i="0" u="none" strike="noStrike">
+                          <a:solidFill>
+                            <a:srgbClr val="000000"/>
+                          </a:solidFill>
+                          <a:effectLst/>
+                          <a:latin typeface="Palatino"/>
+                        </a:rPr>
+                        <a:t>3</a:t>
+                      </a:r>
+                    </a:p>
+                  </a:txBody>
+                  <a:tcPr marL="12700" marR="12700" marT="12700" marB="0" anchor="ctr">
+                    <a:lnL w="6350" cap="flat" cmpd="sng" algn="ctr">
+                      <a:solidFill>
+                        <a:srgbClr val="000000"/>
+                      </a:solidFill>
+                      <a:prstDash val="solid"/>
+                      <a:round/>
+                      <a:headEnd type="none" w="med" len="med"/>
+                      <a:tailEnd type="none" w="med" len="med"/>
+                    </a:lnL>
+                    <a:lnR w="6350" cap="flat" cmpd="sng" algn="ctr">
+                      <a:solidFill>
+                        <a:srgbClr val="000000"/>
+                      </a:solidFill>
+                      <a:prstDash val="solid"/>
+                      <a:round/>
+                      <a:headEnd type="none" w="med" len="med"/>
+                      <a:tailEnd type="none" w="med" len="med"/>
+                    </a:lnR>
+                    <a:lnT w="6350" cap="flat" cmpd="sng" algn="ctr">
+                      <a:solidFill>
+                        <a:srgbClr val="000000"/>
+                      </a:solidFill>
+                      <a:prstDash val="solid"/>
+                      <a:round/>
+                      <a:headEnd type="none" w="med" len="med"/>
+                      <a:tailEnd type="none" w="med" len="med"/>
+                    </a:lnT>
+                    <a:lnB w="6350" cap="flat" cmpd="sng" algn="ctr">
+                      <a:solidFill>
+                        <a:srgbClr val="000000"/>
+                      </a:solidFill>
+                      <a:prstDash val="solid"/>
+                      <a:round/>
+                      <a:headEnd type="none" w="med" len="med"/>
+                      <a:tailEnd type="none" w="med" len="med"/>
+                    </a:lnB>
+                  </a:tcPr>
+                </a:tc>
+                <a:tc>
+                  <a:txBody>
+                    <a:bodyPr/>
+                    <a:lstStyle/>
+                    <a:p>
+                      <a:pPr algn="ctr" fontAlgn="ctr"/>
+                      <a:r>
+                        <a:rPr lang="en-US" sz="1800" b="0" i="0" u="none" strike="noStrike">
+                          <a:solidFill>
+                            <a:srgbClr val="000000"/>
+                          </a:solidFill>
+                          <a:effectLst/>
+                          <a:latin typeface="Palatino"/>
+                        </a:rPr>
+                        <a:t>4</a:t>
+                      </a:r>
+                    </a:p>
+                  </a:txBody>
+                  <a:tcPr marL="12700" marR="12700" marT="12700" marB="0" anchor="ctr">
+                    <a:lnL w="6350" cap="flat" cmpd="sng" algn="ctr">
+                      <a:solidFill>
+                        <a:srgbClr val="000000"/>
+                      </a:solidFill>
+                      <a:prstDash val="solid"/>
+                      <a:round/>
+                      <a:headEnd type="none" w="med" len="med"/>
+                      <a:tailEnd type="none" w="med" len="med"/>
+                    </a:lnL>
+                    <a:lnR w="6350" cap="flat" cmpd="sng" algn="ctr">
+                      <a:solidFill>
+                        <a:srgbClr val="000000"/>
+                      </a:solidFill>
+                      <a:prstDash val="solid"/>
+                      <a:round/>
+                      <a:headEnd type="none" w="med" len="med"/>
+                      <a:tailEnd type="none" w="med" len="med"/>
+                    </a:lnR>
+                    <a:lnT w="6350" cap="flat" cmpd="sng" algn="ctr">
+                      <a:solidFill>
+                        <a:srgbClr val="000000"/>
+                      </a:solidFill>
+                      <a:prstDash val="solid"/>
+                      <a:round/>
+                      <a:headEnd type="none" w="med" len="med"/>
+                      <a:tailEnd type="none" w="med" len="med"/>
+                    </a:lnT>
+                    <a:lnB w="6350" cap="flat" cmpd="sng" algn="ctr">
+                      <a:solidFill>
+                        <a:srgbClr val="000000"/>
+                      </a:solidFill>
+                      <a:prstDash val="solid"/>
+                      <a:round/>
+                      <a:headEnd type="none" w="med" len="med"/>
+                      <a:tailEnd type="none" w="med" len="med"/>
+                    </a:lnB>
+                  </a:tcPr>
+                </a:tc>
+                <a:tc>
+                  <a:txBody>
+                    <a:bodyPr/>
+                    <a:lstStyle/>
+                    <a:p>
+                      <a:pPr algn="ctr" fontAlgn="ctr"/>
+                      <a:r>
+                        <a:rPr lang="is-IS" sz="1800" b="0" i="0" u="none" strike="noStrike">
+                          <a:solidFill>
+                            <a:srgbClr val="000000"/>
+                          </a:solidFill>
+                          <a:effectLst/>
+                          <a:latin typeface="Palatino"/>
+                        </a:rPr>
+                        <a:t>2</a:t>
+                      </a:r>
+                    </a:p>
+                  </a:txBody>
+                  <a:tcPr marL="12700" marR="12700" marT="12700" marB="0" anchor="ctr">
+                    <a:lnL w="6350" cap="flat" cmpd="sng" algn="ctr">
+                      <a:solidFill>
+                        <a:srgbClr val="000000"/>
+                      </a:solidFill>
+                      <a:prstDash val="solid"/>
+                      <a:round/>
+                      <a:headEnd type="none" w="med" len="med"/>
+                      <a:tailEnd type="none" w="med" len="med"/>
+                    </a:lnL>
+                    <a:lnR w="12700" cap="flat" cmpd="sng" algn="ctr">
+                      <a:solidFill>
+                        <a:srgbClr val="000000"/>
+                      </a:solidFill>
+                      <a:prstDash val="solid"/>
+                      <a:round/>
+                      <a:headEnd type="none" w="med" len="med"/>
+                      <a:tailEnd type="none" w="med" len="med"/>
+                    </a:lnR>
+                    <a:lnT w="6350" cap="flat" cmpd="sng" algn="ctr">
+                      <a:solidFill>
+                        <a:srgbClr val="000000"/>
+                      </a:solidFill>
+                      <a:prstDash val="solid"/>
+                      <a:round/>
+                      <a:headEnd type="none" w="med" len="med"/>
+                      <a:tailEnd type="none" w="med" len="med"/>
+                    </a:lnT>
+                    <a:lnB w="6350" cap="flat" cmpd="sng" algn="ctr">
+                      <a:solidFill>
+                        <a:srgbClr val="000000"/>
+                      </a:solidFill>
+                      <a:prstDash val="solid"/>
+                      <a:round/>
+                      <a:headEnd type="none" w="med" len="med"/>
+                      <a:tailEnd type="none" w="med" len="med"/>
+                    </a:lnB>
+                    <a:solidFill>
+                      <a:srgbClr val="BFBFBF"/>
+                    </a:solidFill>
+                  </a:tcPr>
+                </a:tc>
+              </a:tr>
+              <a:tr h="787400">
+                <a:tc>
+                  <a:txBody>
+                    <a:bodyPr/>
+                    <a:lstStyle/>
+                    <a:p>
+                      <a:pPr algn="ctr" fontAlgn="ctr"/>
+                      <a:r>
+                        <a:rPr lang="is-IS" sz="1800" b="0" i="0" u="none" strike="noStrike">
+                          <a:solidFill>
+                            <a:srgbClr val="000000"/>
+                          </a:solidFill>
+                          <a:effectLst/>
+                          <a:latin typeface="Palatino"/>
+                        </a:rPr>
+                        <a:t>2</a:t>
+                      </a:r>
+                    </a:p>
+                  </a:txBody>
+                  <a:tcPr marL="12700" marR="12700" marT="12700" marB="0" anchor="ctr">
+                    <a:lnL w="12700" cap="flat" cmpd="sng" algn="ctr">
+                      <a:solidFill>
+                        <a:srgbClr val="000000"/>
+                      </a:solidFill>
+                      <a:prstDash val="solid"/>
+                      <a:round/>
+                      <a:headEnd type="none" w="med" len="med"/>
+                      <a:tailEnd type="none" w="med" len="med"/>
+                    </a:lnL>
+                    <a:lnR w="6350" cap="flat" cmpd="sng" algn="ctr">
+                      <a:solidFill>
+                        <a:srgbClr val="000000"/>
+                      </a:solidFill>
+                      <a:prstDash val="solid"/>
+                      <a:round/>
+                      <a:headEnd type="none" w="med" len="med"/>
+                      <a:tailEnd type="none" w="med" len="med"/>
+                    </a:lnR>
+                    <a:lnT w="6350" cap="flat" cmpd="sng" algn="ctr">
+                      <a:solidFill>
+                        <a:srgbClr val="000000"/>
+                      </a:solidFill>
+                      <a:prstDash val="solid"/>
+                      <a:round/>
+                      <a:headEnd type="none" w="med" len="med"/>
+                      <a:tailEnd type="none" w="med" len="med"/>
+                    </a:lnT>
+                    <a:lnB w="6350" cap="flat" cmpd="sng" algn="ctr">
+                      <a:solidFill>
+                        <a:srgbClr val="000000"/>
+                      </a:solidFill>
+                      <a:prstDash val="solid"/>
+                      <a:round/>
+                      <a:headEnd type="none" w="med" len="med"/>
+                      <a:tailEnd type="none" w="med" len="med"/>
+                    </a:lnB>
+                    <a:solidFill>
+                      <a:srgbClr val="BFBFBF"/>
+                    </a:solidFill>
+                  </a:tcPr>
+                </a:tc>
+                <a:tc>
+                  <a:txBody>
+                    <a:bodyPr/>
+                    <a:lstStyle/>
+                    <a:p>
+                      <a:pPr algn="ctr" fontAlgn="ctr"/>
+                      <a:r>
+                        <a:rPr lang="en-US" sz="1800" b="0" i="0" u="none" strike="noStrike">
+                          <a:solidFill>
+                            <a:srgbClr val="000000"/>
+                          </a:solidFill>
+                          <a:effectLst/>
+                          <a:latin typeface="Palatino"/>
+                        </a:rPr>
+                        <a:t>3</a:t>
+                      </a:r>
+                    </a:p>
+                  </a:txBody>
+                  <a:tcPr marL="12700" marR="12700" marT="12700" marB="0" anchor="ctr">
+                    <a:lnL w="6350" cap="flat" cmpd="sng" algn="ctr">
+                      <a:solidFill>
+                        <a:srgbClr val="000000"/>
+                      </a:solidFill>
+                      <a:prstDash val="solid"/>
+                      <a:round/>
+                      <a:headEnd type="none" w="med" len="med"/>
+                      <a:tailEnd type="none" w="med" len="med"/>
+                    </a:lnL>
+                    <a:lnR w="6350" cap="flat" cmpd="sng" algn="ctr">
+                      <a:solidFill>
+                        <a:srgbClr val="000000"/>
+                      </a:solidFill>
+                      <a:prstDash val="solid"/>
+                      <a:round/>
+                      <a:headEnd type="none" w="med" len="med"/>
+                      <a:tailEnd type="none" w="med" len="med"/>
+                    </a:lnR>
+                    <a:lnT w="6350" cap="flat" cmpd="sng" algn="ctr">
+                      <a:solidFill>
+                        <a:srgbClr val="000000"/>
+                      </a:solidFill>
+                      <a:prstDash val="solid"/>
+                      <a:round/>
+                      <a:headEnd type="none" w="med" len="med"/>
+                      <a:tailEnd type="none" w="med" len="med"/>
+                    </a:lnT>
+                    <a:lnB w="6350" cap="flat" cmpd="sng" algn="ctr">
+                      <a:solidFill>
+                        <a:srgbClr val="000000"/>
+                      </a:solidFill>
+                      <a:prstDash val="solid"/>
+                      <a:round/>
+                      <a:headEnd type="none" w="med" len="med"/>
+                      <a:tailEnd type="none" w="med" len="med"/>
+                    </a:lnB>
+                    <a:solidFill>
+                      <a:srgbClr val="BFBFBF"/>
+                    </a:solidFill>
+                  </a:tcPr>
+                </a:tc>
+                <a:tc>
+                  <a:txBody>
+                    <a:bodyPr/>
+                    <a:lstStyle/>
+                    <a:p>
+                      <a:pPr algn="ctr" fontAlgn="ctr"/>
+                      <a:r>
+                        <a:rPr lang="en-US" sz="1800" b="0" i="0" u="none" strike="noStrike">
+                          <a:solidFill>
+                            <a:srgbClr val="000000"/>
+                          </a:solidFill>
+                          <a:effectLst/>
+                          <a:latin typeface="Palatino"/>
+                        </a:rPr>
+                        <a:t>3</a:t>
+                      </a:r>
+                    </a:p>
+                  </a:txBody>
+                  <a:tcPr marL="12700" marR="12700" marT="12700" marB="0" anchor="ctr">
+                    <a:lnL w="6350" cap="flat" cmpd="sng" algn="ctr">
+                      <a:solidFill>
+                        <a:srgbClr val="000000"/>
+                      </a:solidFill>
+                      <a:prstDash val="solid"/>
+                      <a:round/>
+                      <a:headEnd type="none" w="med" len="med"/>
+                      <a:tailEnd type="none" w="med" len="med"/>
+                    </a:lnL>
+                    <a:lnR w="6350" cap="flat" cmpd="sng" algn="ctr">
+                      <a:solidFill>
+                        <a:srgbClr val="000000"/>
+                      </a:solidFill>
+                      <a:prstDash val="solid"/>
+                      <a:round/>
+                      <a:headEnd type="none" w="med" len="med"/>
+                      <a:tailEnd type="none" w="med" len="med"/>
+                    </a:lnR>
+                    <a:lnT w="6350" cap="flat" cmpd="sng" algn="ctr">
+                      <a:solidFill>
+                        <a:srgbClr val="000000"/>
+                      </a:solidFill>
+                      <a:prstDash val="solid"/>
+                      <a:round/>
+                      <a:headEnd type="none" w="med" len="med"/>
+                      <a:tailEnd type="none" w="med" len="med"/>
+                    </a:lnT>
+                    <a:lnB w="6350" cap="flat" cmpd="sng" algn="ctr">
+                      <a:solidFill>
+                        <a:srgbClr val="000000"/>
+                      </a:solidFill>
+                      <a:prstDash val="solid"/>
+                      <a:round/>
+                      <a:headEnd type="none" w="med" len="med"/>
+                      <a:tailEnd type="none" w="med" len="med"/>
+                    </a:lnB>
+                    <a:solidFill>
+                      <a:srgbClr val="BFBFBF"/>
+                    </a:solidFill>
+                  </a:tcPr>
+                </a:tc>
+                <a:tc>
+                  <a:txBody>
+                    <a:bodyPr/>
+                    <a:lstStyle/>
+                    <a:p>
+                      <a:pPr algn="ctr" fontAlgn="ctr"/>
+                      <a:r>
+                        <a:rPr lang="is-IS" sz="1800" b="0" i="0" u="none" strike="noStrike">
+                          <a:solidFill>
+                            <a:srgbClr val="000000"/>
+                          </a:solidFill>
+                          <a:effectLst/>
+                          <a:latin typeface="Palatino"/>
+                        </a:rPr>
+                        <a:t>2</a:t>
+                      </a:r>
+                    </a:p>
+                  </a:txBody>
+                  <a:tcPr marL="12700" marR="12700" marT="12700" marB="0" anchor="ctr">
+                    <a:lnL w="6350" cap="flat" cmpd="sng" algn="ctr">
+                      <a:solidFill>
+                        <a:srgbClr val="000000"/>
+                      </a:solidFill>
+                      <a:prstDash val="solid"/>
+                      <a:round/>
+                      <a:headEnd type="none" w="med" len="med"/>
+                      <a:tailEnd type="none" w="med" len="med"/>
+                    </a:lnL>
+                    <a:lnR w="12700" cap="flat" cmpd="sng" algn="ctr">
+                      <a:solidFill>
+                        <a:srgbClr val="000000"/>
+                      </a:solidFill>
+                      <a:prstDash val="solid"/>
+                      <a:round/>
+                      <a:headEnd type="none" w="med" len="med"/>
+                      <a:tailEnd type="none" w="med" len="med"/>
+                    </a:lnR>
+                    <a:lnT w="6350" cap="flat" cmpd="sng" algn="ctr">
+                      <a:solidFill>
+                        <a:srgbClr val="000000"/>
+                      </a:solidFill>
+                      <a:prstDash val="solid"/>
+                      <a:round/>
+                      <a:headEnd type="none" w="med" len="med"/>
+                      <a:tailEnd type="none" w="med" len="med"/>
+                    </a:lnT>
+                    <a:lnB w="6350" cap="flat" cmpd="sng" algn="ctr">
+                      <a:solidFill>
+                        <a:srgbClr val="000000"/>
+                      </a:solidFill>
+                      <a:prstDash val="solid"/>
+                      <a:round/>
+                      <a:headEnd type="none" w="med" len="med"/>
+                      <a:tailEnd type="none" w="med" len="med"/>
+                    </a:lnB>
+                  </a:tcPr>
+                </a:tc>
+                <a:tc>
+                  <a:txBody>
+                    <a:bodyPr/>
+                    <a:lstStyle/>
+                    <a:p>
+                      <a:pPr algn="l" fontAlgn="b"/>
+                      <a:endParaRPr lang="en-US" sz="1200" b="0" i="0" u="none" strike="noStrike">
+                        <a:solidFill>
+                          <a:srgbClr val="000000"/>
+                        </a:solidFill>
+                        <a:effectLst/>
+                        <a:latin typeface="Calibri"/>
+                      </a:endParaRPr>
+                    </a:p>
+                  </a:txBody>
+                  <a:tcPr marL="12700" marR="12700" marT="12700" marB="0" anchor="b">
+                    <a:lnL w="12700" cap="flat" cmpd="sng" algn="ctr">
+                      <a:solidFill>
+                        <a:srgbClr val="000000"/>
+                      </a:solidFill>
+                      <a:prstDash val="solid"/>
+                      <a:round/>
+                      <a:headEnd type="none" w="med" len="med"/>
+                      <a:tailEnd type="none" w="med" len="med"/>
+                    </a:lnL>
+                    <a:lnR w="12700" cap="flat" cmpd="sng" algn="ctr">
+                      <a:solidFill>
+                        <a:srgbClr val="000000"/>
+                      </a:solidFill>
+                      <a:prstDash val="solid"/>
+                      <a:round/>
+                      <a:headEnd type="none" w="med" len="med"/>
+                      <a:tailEnd type="none" w="med" len="med"/>
+                    </a:lnR>
+                    <a:lnT>
+                      <a:noFill/>
+                    </a:lnT>
+                    <a:lnB>
+                      <a:noFill/>
+                    </a:lnB>
+                  </a:tcPr>
+                </a:tc>
+                <a:tc>
+                  <a:txBody>
+                    <a:bodyPr/>
+                    <a:lstStyle/>
+                    <a:p>
+                      <a:pPr algn="ctr" fontAlgn="ctr"/>
+                      <a:r>
+                        <a:rPr lang="is-IS" sz="1800" b="0" i="0" u="none" strike="noStrike">
+                          <a:solidFill>
+                            <a:srgbClr val="000000"/>
+                          </a:solidFill>
+                          <a:effectLst/>
+                          <a:latin typeface="Palatino"/>
+                        </a:rPr>
+                        <a:t>2</a:t>
+                      </a:r>
+                    </a:p>
+                  </a:txBody>
+                  <a:tcPr marL="12700" marR="12700" marT="12700" marB="0" anchor="ctr">
+                    <a:lnL w="12700" cap="flat" cmpd="sng" algn="ctr">
+                      <a:solidFill>
+                        <a:srgbClr val="000000"/>
+                      </a:solidFill>
+                      <a:prstDash val="solid"/>
+                      <a:round/>
+                      <a:headEnd type="none" w="med" len="med"/>
+                      <a:tailEnd type="none" w="med" len="med"/>
+                    </a:lnL>
+                    <a:lnR w="6350" cap="flat" cmpd="sng" algn="ctr">
+                      <a:solidFill>
+                        <a:srgbClr val="000000"/>
+                      </a:solidFill>
+                      <a:prstDash val="solid"/>
+                      <a:round/>
+                      <a:headEnd type="none" w="med" len="med"/>
+                      <a:tailEnd type="none" w="med" len="med"/>
+                    </a:lnR>
+                    <a:lnT w="6350" cap="flat" cmpd="sng" algn="ctr">
+                      <a:solidFill>
+                        <a:srgbClr val="000000"/>
+                      </a:solidFill>
+                      <a:prstDash val="solid"/>
+                      <a:round/>
+                      <a:headEnd type="none" w="med" len="med"/>
+                      <a:tailEnd type="none" w="med" len="med"/>
+                    </a:lnT>
+                    <a:lnB w="6350" cap="flat" cmpd="sng" algn="ctr">
+                      <a:solidFill>
+                        <a:srgbClr val="000000"/>
+                      </a:solidFill>
+                      <a:prstDash val="solid"/>
+                      <a:round/>
+                      <a:headEnd type="none" w="med" len="med"/>
+                      <a:tailEnd type="none" w="med" len="med"/>
+                    </a:lnB>
+                    <a:solidFill>
+                      <a:srgbClr val="BFBFBF"/>
+                    </a:solidFill>
+                  </a:tcPr>
+                </a:tc>
+                <a:tc>
+                  <a:txBody>
+                    <a:bodyPr/>
+                    <a:lstStyle/>
+                    <a:p>
+                      <a:pPr algn="ctr" fontAlgn="ctr"/>
+                      <a:r>
+                        <a:rPr lang="en-US" sz="1800" b="0" i="0" u="none" strike="noStrike">
+                          <a:solidFill>
+                            <a:srgbClr val="000000"/>
+                          </a:solidFill>
+                          <a:effectLst/>
+                          <a:latin typeface="Palatino"/>
+                        </a:rPr>
+                        <a:t>3</a:t>
+                      </a:r>
+                    </a:p>
+                  </a:txBody>
+                  <a:tcPr marL="12700" marR="12700" marT="12700" marB="0" anchor="ctr">
+                    <a:lnL w="6350" cap="flat" cmpd="sng" algn="ctr">
+                      <a:solidFill>
+                        <a:srgbClr val="000000"/>
+                      </a:solidFill>
+                      <a:prstDash val="solid"/>
+                      <a:round/>
+                      <a:headEnd type="none" w="med" len="med"/>
+                      <a:tailEnd type="none" w="med" len="med"/>
+                    </a:lnL>
+                    <a:lnR w="6350" cap="flat" cmpd="sng" algn="ctr">
+                      <a:solidFill>
+                        <a:srgbClr val="000000"/>
+                      </a:solidFill>
+                      <a:prstDash val="solid"/>
+                      <a:round/>
+                      <a:headEnd type="none" w="med" len="med"/>
+                      <a:tailEnd type="none" w="med" len="med"/>
+                    </a:lnR>
+                    <a:lnT w="6350" cap="flat" cmpd="sng" algn="ctr">
+                      <a:solidFill>
+                        <a:srgbClr val="000000"/>
+                      </a:solidFill>
+                      <a:prstDash val="solid"/>
+                      <a:round/>
+                      <a:headEnd type="none" w="med" len="med"/>
+                      <a:tailEnd type="none" w="med" len="med"/>
+                    </a:lnT>
+                    <a:lnB w="6350" cap="flat" cmpd="sng" algn="ctr">
+                      <a:solidFill>
+                        <a:srgbClr val="000000"/>
+                      </a:solidFill>
+                      <a:prstDash val="solid"/>
+                      <a:round/>
+                      <a:headEnd type="none" w="med" len="med"/>
+                      <a:tailEnd type="none" w="med" len="med"/>
+                    </a:lnB>
+                    <a:solidFill>
+                      <a:srgbClr val="BFBFBF"/>
+                    </a:solidFill>
+                  </a:tcPr>
+                </a:tc>
+                <a:tc>
+                  <a:txBody>
+                    <a:bodyPr/>
+                    <a:lstStyle/>
+                    <a:p>
+                      <a:pPr algn="ctr" fontAlgn="ctr"/>
+                      <a:r>
+                        <a:rPr lang="en-US" sz="1800" b="0" i="0" u="none" strike="noStrike">
+                          <a:solidFill>
+                            <a:srgbClr val="000000"/>
+                          </a:solidFill>
+                          <a:effectLst/>
+                          <a:latin typeface="Palatino"/>
+                        </a:rPr>
+                        <a:t>3</a:t>
+                      </a:r>
+                    </a:p>
+                  </a:txBody>
+                  <a:tcPr marL="12700" marR="12700" marT="12700" marB="0" anchor="ctr">
+                    <a:lnL w="6350" cap="flat" cmpd="sng" algn="ctr">
+                      <a:solidFill>
+                        <a:srgbClr val="000000"/>
+                      </a:solidFill>
+                      <a:prstDash val="solid"/>
+                      <a:round/>
+                      <a:headEnd type="none" w="med" len="med"/>
+                      <a:tailEnd type="none" w="med" len="med"/>
+                    </a:lnL>
+                    <a:lnR w="6350" cap="flat" cmpd="sng" algn="ctr">
+                      <a:solidFill>
+                        <a:srgbClr val="000000"/>
+                      </a:solidFill>
+                      <a:prstDash val="solid"/>
+                      <a:round/>
+                      <a:headEnd type="none" w="med" len="med"/>
+                      <a:tailEnd type="none" w="med" len="med"/>
+                    </a:lnR>
+                    <a:lnT w="6350" cap="flat" cmpd="sng" algn="ctr">
+                      <a:solidFill>
+                        <a:srgbClr val="000000"/>
+                      </a:solidFill>
+                      <a:prstDash val="solid"/>
+                      <a:round/>
+                      <a:headEnd type="none" w="med" len="med"/>
+                      <a:tailEnd type="none" w="med" len="med"/>
+                    </a:lnT>
+                    <a:lnB w="6350" cap="flat" cmpd="sng" algn="ctr">
+                      <a:solidFill>
+                        <a:srgbClr val="000000"/>
+                      </a:solidFill>
+                      <a:prstDash val="solid"/>
+                      <a:round/>
+                      <a:headEnd type="none" w="med" len="med"/>
+                      <a:tailEnd type="none" w="med" len="med"/>
+                    </a:lnB>
+                    <a:solidFill>
+                      <a:srgbClr val="BFBFBF"/>
+                    </a:solidFill>
+                  </a:tcPr>
+                </a:tc>
+                <a:tc>
+                  <a:txBody>
+                    <a:bodyPr/>
+                    <a:lstStyle/>
+                    <a:p>
+                      <a:pPr algn="ctr" fontAlgn="ctr"/>
+                      <a:r>
+                        <a:rPr lang="is-IS" sz="1800" b="0" i="0" u="none" strike="noStrike">
+                          <a:solidFill>
+                            <a:srgbClr val="000000"/>
+                          </a:solidFill>
+                          <a:effectLst/>
+                          <a:latin typeface="Palatino"/>
+                        </a:rPr>
+                        <a:t>2</a:t>
+                      </a:r>
+                    </a:p>
+                  </a:txBody>
+                  <a:tcPr marL="12700" marR="12700" marT="12700" marB="0" anchor="ctr">
+                    <a:lnL w="6350" cap="flat" cmpd="sng" algn="ctr">
+                      <a:solidFill>
+                        <a:srgbClr val="000000"/>
+                      </a:solidFill>
+                      <a:prstDash val="solid"/>
+                      <a:round/>
+                      <a:headEnd type="none" w="med" len="med"/>
+                      <a:tailEnd type="none" w="med" len="med"/>
+                    </a:lnL>
+                    <a:lnR w="12700" cap="flat" cmpd="sng" algn="ctr">
+                      <a:solidFill>
+                        <a:srgbClr val="000000"/>
+                      </a:solidFill>
+                      <a:prstDash val="solid"/>
+                      <a:round/>
+                      <a:headEnd type="none" w="med" len="med"/>
+                      <a:tailEnd type="none" w="med" len="med"/>
+                    </a:lnR>
+                    <a:lnT w="6350" cap="flat" cmpd="sng" algn="ctr">
+                      <a:solidFill>
+                        <a:srgbClr val="000000"/>
+                      </a:solidFill>
+                      <a:prstDash val="solid"/>
+                      <a:round/>
+                      <a:headEnd type="none" w="med" len="med"/>
+                      <a:tailEnd type="none" w="med" len="med"/>
+                    </a:lnT>
+                    <a:lnB w="6350" cap="flat" cmpd="sng" algn="ctr">
+                      <a:solidFill>
+                        <a:srgbClr val="000000"/>
+                      </a:solidFill>
+                      <a:prstDash val="solid"/>
+                      <a:round/>
+                      <a:headEnd type="none" w="med" len="med"/>
+                      <a:tailEnd type="none" w="med" len="med"/>
+                    </a:lnB>
+                  </a:tcPr>
+                </a:tc>
+              </a:tr>
+              <a:tr h="787400">
+                <a:tc>
+                  <a:txBody>
+                    <a:bodyPr/>
+                    <a:lstStyle/>
+                    <a:p>
+                      <a:pPr algn="ctr" fontAlgn="ctr"/>
+                      <a:r>
+                        <a:rPr lang="en-US" sz="1800" b="0" i="0" u="none" strike="noStrike">
+                          <a:solidFill>
+                            <a:srgbClr val="000000"/>
+                          </a:solidFill>
+                          <a:effectLst/>
+                          <a:latin typeface="Palatino"/>
+                        </a:rPr>
+                        <a:t>3</a:t>
+                      </a:r>
+                    </a:p>
+                  </a:txBody>
+                  <a:tcPr marL="12700" marR="12700" marT="12700" marB="0" anchor="ctr">
+                    <a:lnL w="12700" cap="flat" cmpd="sng" algn="ctr">
+                      <a:solidFill>
+                        <a:srgbClr val="000000"/>
+                      </a:solidFill>
+                      <a:prstDash val="solid"/>
+                      <a:round/>
+                      <a:headEnd type="none" w="med" len="med"/>
+                      <a:tailEnd type="none" w="med" len="med"/>
+                    </a:lnL>
+                    <a:lnR w="6350" cap="flat" cmpd="sng" algn="ctr">
+                      <a:solidFill>
+                        <a:srgbClr val="000000"/>
+                      </a:solidFill>
+                      <a:prstDash val="solid"/>
+                      <a:round/>
+                      <a:headEnd type="none" w="med" len="med"/>
+                      <a:tailEnd type="none" w="med" len="med"/>
+                    </a:lnR>
+                    <a:lnT w="6350" cap="flat" cmpd="sng" algn="ctr">
+                      <a:solidFill>
+                        <a:srgbClr val="000000"/>
+                      </a:solidFill>
+                      <a:prstDash val="solid"/>
+                      <a:round/>
+                      <a:headEnd type="none" w="med" len="med"/>
+                      <a:tailEnd type="none" w="med" len="med"/>
+                    </a:lnT>
+                    <a:lnB w="12700" cap="flat" cmpd="sng" algn="ctr">
+                      <a:solidFill>
+                        <a:srgbClr val="000000"/>
+                      </a:solidFill>
+                      <a:prstDash val="solid"/>
+                      <a:round/>
+                      <a:headEnd type="none" w="med" len="med"/>
+                      <a:tailEnd type="none" w="med" len="med"/>
+                    </a:lnB>
+                  </a:tcPr>
+                </a:tc>
+                <a:tc>
+                  <a:txBody>
+                    <a:bodyPr/>
+                    <a:lstStyle/>
+                    <a:p>
+                      <a:pPr algn="ctr" fontAlgn="ctr"/>
+                      <a:r>
+                        <a:rPr lang="en-US" sz="1800" b="0" i="0" u="none" strike="noStrike">
+                          <a:solidFill>
+                            <a:srgbClr val="000000"/>
+                          </a:solidFill>
+                          <a:effectLst/>
+                          <a:latin typeface="Palatino"/>
+                        </a:rPr>
+                        <a:t>3</a:t>
+                      </a:r>
+                    </a:p>
+                  </a:txBody>
+                  <a:tcPr marL="12700" marR="12700" marT="12700" marB="0" anchor="ctr">
+                    <a:lnL w="6350" cap="flat" cmpd="sng" algn="ctr">
+                      <a:solidFill>
+                        <a:srgbClr val="000000"/>
+                      </a:solidFill>
+                      <a:prstDash val="solid"/>
+                      <a:round/>
+                      <a:headEnd type="none" w="med" len="med"/>
+                      <a:tailEnd type="none" w="med" len="med"/>
+                    </a:lnL>
+                    <a:lnR w="6350" cap="flat" cmpd="sng" algn="ctr">
+                      <a:solidFill>
+                        <a:srgbClr val="000000"/>
+                      </a:solidFill>
+                      <a:prstDash val="solid"/>
+                      <a:round/>
+                      <a:headEnd type="none" w="med" len="med"/>
+                      <a:tailEnd type="none" w="med" len="med"/>
+                    </a:lnR>
+                    <a:lnT w="6350" cap="flat" cmpd="sng" algn="ctr">
+                      <a:solidFill>
+                        <a:srgbClr val="000000"/>
+                      </a:solidFill>
+                      <a:prstDash val="solid"/>
+                      <a:round/>
+                      <a:headEnd type="none" w="med" len="med"/>
+                      <a:tailEnd type="none" w="med" len="med"/>
+                    </a:lnT>
+                    <a:lnB w="12700" cap="flat" cmpd="sng" algn="ctr">
+                      <a:solidFill>
+                        <a:srgbClr val="000000"/>
+                      </a:solidFill>
+                      <a:prstDash val="solid"/>
+                      <a:round/>
+                      <a:headEnd type="none" w="med" len="med"/>
+                      <a:tailEnd type="none" w="med" len="med"/>
+                    </a:lnB>
+                  </a:tcPr>
+                </a:tc>
+                <a:tc>
+                  <a:txBody>
+                    <a:bodyPr/>
+                    <a:lstStyle/>
+                    <a:p>
+                      <a:pPr algn="ctr" fontAlgn="ctr"/>
+                      <a:r>
+                        <a:rPr lang="en-US" sz="1800" b="0" i="0" u="none" strike="noStrike">
+                          <a:solidFill>
+                            <a:srgbClr val="000000"/>
+                          </a:solidFill>
+                          <a:effectLst/>
+                          <a:latin typeface="Palatino"/>
+                        </a:rPr>
+                        <a:t>3</a:t>
+                      </a:r>
+                    </a:p>
+                  </a:txBody>
+                  <a:tcPr marL="12700" marR="12700" marT="12700" marB="0" anchor="ctr">
+                    <a:lnL w="6350" cap="flat" cmpd="sng" algn="ctr">
+                      <a:solidFill>
+                        <a:srgbClr val="000000"/>
+                      </a:solidFill>
+                      <a:prstDash val="solid"/>
+                      <a:round/>
+                      <a:headEnd type="none" w="med" len="med"/>
+                      <a:tailEnd type="none" w="med" len="med"/>
+                    </a:lnL>
+                    <a:lnR w="6350" cap="flat" cmpd="sng" algn="ctr">
+                      <a:solidFill>
+                        <a:srgbClr val="000000"/>
+                      </a:solidFill>
+                      <a:prstDash val="solid"/>
+                      <a:round/>
+                      <a:headEnd type="none" w="med" len="med"/>
+                      <a:tailEnd type="none" w="med" len="med"/>
+                    </a:lnR>
+                    <a:lnT w="6350" cap="flat" cmpd="sng" algn="ctr">
+                      <a:solidFill>
+                        <a:srgbClr val="000000"/>
+                      </a:solidFill>
+                      <a:prstDash val="solid"/>
+                      <a:round/>
+                      <a:headEnd type="none" w="med" len="med"/>
+                      <a:tailEnd type="none" w="med" len="med"/>
+                    </a:lnT>
+                    <a:lnB w="12700" cap="flat" cmpd="sng" algn="ctr">
+                      <a:solidFill>
+                        <a:srgbClr val="000000"/>
+                      </a:solidFill>
+                      <a:prstDash val="solid"/>
+                      <a:round/>
+                      <a:headEnd type="none" w="med" len="med"/>
+                      <a:tailEnd type="none" w="med" len="med"/>
+                    </a:lnB>
+                    <a:solidFill>
+                      <a:srgbClr val="BFBFBF"/>
+                    </a:solidFill>
+                  </a:tcPr>
+                </a:tc>
+                <a:tc>
+                  <a:txBody>
+                    <a:bodyPr/>
+                    <a:lstStyle/>
+                    <a:p>
+                      <a:pPr algn="ctr" fontAlgn="ctr"/>
+                      <a:r>
+                        <a:rPr lang="en-US" sz="1800" b="0" i="0" u="none" strike="noStrike">
+                          <a:solidFill>
+                            <a:srgbClr val="000000"/>
+                          </a:solidFill>
+                          <a:effectLst/>
+                          <a:latin typeface="Palatino"/>
+                        </a:rPr>
+                        <a:t>1</a:t>
+                      </a:r>
+                    </a:p>
+                  </a:txBody>
+                  <a:tcPr marL="12700" marR="12700" marT="12700" marB="0" anchor="ctr">
+                    <a:lnL w="6350" cap="flat" cmpd="sng" algn="ctr">
+                      <a:solidFill>
+                        <a:srgbClr val="000000"/>
+                      </a:solidFill>
+                      <a:prstDash val="solid"/>
+                      <a:round/>
+                      <a:headEnd type="none" w="med" len="med"/>
+                      <a:tailEnd type="none" w="med" len="med"/>
+                    </a:lnL>
+                    <a:lnR w="12700" cap="flat" cmpd="sng" algn="ctr">
+                      <a:solidFill>
+                        <a:srgbClr val="000000"/>
+                      </a:solidFill>
+                      <a:prstDash val="solid"/>
+                      <a:round/>
+                      <a:headEnd type="none" w="med" len="med"/>
+                      <a:tailEnd type="none" w="med" len="med"/>
+                    </a:lnR>
+                    <a:lnT w="6350" cap="flat" cmpd="sng" algn="ctr">
+                      <a:solidFill>
+                        <a:srgbClr val="000000"/>
+                      </a:solidFill>
+                      <a:prstDash val="solid"/>
+                      <a:round/>
+                      <a:headEnd type="none" w="med" len="med"/>
+                      <a:tailEnd type="none" w="med" len="med"/>
+                    </a:lnT>
+                    <a:lnB w="12700" cap="flat" cmpd="sng" algn="ctr">
+                      <a:solidFill>
+                        <a:srgbClr val="000000"/>
+                      </a:solidFill>
+                      <a:prstDash val="solid"/>
+                      <a:round/>
+                      <a:headEnd type="none" w="med" len="med"/>
+                      <a:tailEnd type="none" w="med" len="med"/>
+                    </a:lnB>
+                  </a:tcPr>
+                </a:tc>
+                <a:tc>
+                  <a:txBody>
+                    <a:bodyPr/>
+                    <a:lstStyle/>
+                    <a:p>
+                      <a:pPr algn="l" fontAlgn="b"/>
+                      <a:endParaRPr lang="en-US" sz="1200" b="0" i="0" u="none" strike="noStrike">
+                        <a:solidFill>
+                          <a:srgbClr val="000000"/>
+                        </a:solidFill>
+                        <a:effectLst/>
+                        <a:latin typeface="Calibri"/>
+                      </a:endParaRPr>
+                    </a:p>
+                  </a:txBody>
+                  <a:tcPr marL="12700" marR="12700" marT="12700" marB="0" anchor="b">
+                    <a:lnL w="12700" cap="flat" cmpd="sng" algn="ctr">
+                      <a:solidFill>
+                        <a:srgbClr val="000000"/>
+                      </a:solidFill>
+                      <a:prstDash val="solid"/>
+                      <a:round/>
+                      <a:headEnd type="none" w="med" len="med"/>
+                      <a:tailEnd type="none" w="med" len="med"/>
+                    </a:lnL>
+                    <a:lnR w="12700" cap="flat" cmpd="sng" algn="ctr">
+                      <a:solidFill>
+                        <a:srgbClr val="000000"/>
+                      </a:solidFill>
+                      <a:prstDash val="solid"/>
+                      <a:round/>
+                      <a:headEnd type="none" w="med" len="med"/>
+                      <a:tailEnd type="none" w="med" len="med"/>
+                    </a:lnR>
+                    <a:lnT>
+                      <a:noFill/>
+                    </a:lnT>
+                    <a:lnB>
+                      <a:noFill/>
+                    </a:lnB>
+                  </a:tcPr>
+                </a:tc>
+                <a:tc>
+                  <a:txBody>
+                    <a:bodyPr/>
+                    <a:lstStyle/>
+                    <a:p>
+                      <a:pPr algn="ctr" fontAlgn="ctr"/>
+                      <a:r>
+                        <a:rPr lang="en-US" sz="1800" b="0" i="0" u="none" strike="noStrike">
+                          <a:solidFill>
+                            <a:srgbClr val="000000"/>
+                          </a:solidFill>
+                          <a:effectLst/>
+                          <a:latin typeface="Palatino"/>
+                        </a:rPr>
+                        <a:t>3</a:t>
+                      </a:r>
+                    </a:p>
+                  </a:txBody>
+                  <a:tcPr marL="12700" marR="12700" marT="12700" marB="0" anchor="ctr">
+                    <a:lnL w="12700" cap="flat" cmpd="sng" algn="ctr">
+                      <a:solidFill>
+                        <a:srgbClr val="000000"/>
+                      </a:solidFill>
+                      <a:prstDash val="solid"/>
+                      <a:round/>
+                      <a:headEnd type="none" w="med" len="med"/>
+                      <a:tailEnd type="none" w="med" len="med"/>
+                    </a:lnL>
+                    <a:lnR w="6350" cap="flat" cmpd="sng" algn="ctr">
+                      <a:solidFill>
+                        <a:srgbClr val="000000"/>
+                      </a:solidFill>
+                      <a:prstDash val="solid"/>
+                      <a:round/>
+                      <a:headEnd type="none" w="med" len="med"/>
+                      <a:tailEnd type="none" w="med" len="med"/>
+                    </a:lnR>
+                    <a:lnT w="6350" cap="flat" cmpd="sng" algn="ctr">
+                      <a:solidFill>
+                        <a:srgbClr val="000000"/>
+                      </a:solidFill>
+                      <a:prstDash val="solid"/>
+                      <a:round/>
+                      <a:headEnd type="none" w="med" len="med"/>
+                      <a:tailEnd type="none" w="med" len="med"/>
+                    </a:lnT>
+                    <a:lnB w="12700" cap="flat" cmpd="sng" algn="ctr">
+                      <a:solidFill>
+                        <a:srgbClr val="000000"/>
+                      </a:solidFill>
+                      <a:prstDash val="solid"/>
+                      <a:round/>
+                      <a:headEnd type="none" w="med" len="med"/>
+                      <a:tailEnd type="none" w="med" len="med"/>
+                    </a:lnB>
+                    <a:solidFill>
+                      <a:srgbClr val="BFBFBF"/>
+                    </a:solidFill>
+                  </a:tcPr>
+                </a:tc>
+                <a:tc>
+                  <a:txBody>
+                    <a:bodyPr/>
+                    <a:lstStyle/>
+                    <a:p>
+                      <a:pPr algn="ctr" fontAlgn="ctr"/>
+                      <a:r>
+                        <a:rPr lang="en-US" sz="1800" b="0" i="0" u="none" strike="noStrike">
+                          <a:solidFill>
+                            <a:srgbClr val="000000"/>
+                          </a:solidFill>
+                          <a:effectLst/>
+                          <a:latin typeface="Palatino"/>
+                        </a:rPr>
+                        <a:t>3</a:t>
+                      </a:r>
+                    </a:p>
+                  </a:txBody>
+                  <a:tcPr marL="12700" marR="12700" marT="12700" marB="0" anchor="ctr">
+                    <a:lnL w="6350" cap="flat" cmpd="sng" algn="ctr">
+                      <a:solidFill>
+                        <a:srgbClr val="000000"/>
+                      </a:solidFill>
+                      <a:prstDash val="solid"/>
+                      <a:round/>
+                      <a:headEnd type="none" w="med" len="med"/>
+                      <a:tailEnd type="none" w="med" len="med"/>
+                    </a:lnL>
+                    <a:lnR w="6350" cap="flat" cmpd="sng" algn="ctr">
+                      <a:solidFill>
+                        <a:srgbClr val="000000"/>
+                      </a:solidFill>
+                      <a:prstDash val="solid"/>
+                      <a:round/>
+                      <a:headEnd type="none" w="med" len="med"/>
+                      <a:tailEnd type="none" w="med" len="med"/>
+                    </a:lnR>
+                    <a:lnT w="6350" cap="flat" cmpd="sng" algn="ctr">
+                      <a:solidFill>
+                        <a:srgbClr val="000000"/>
+                      </a:solidFill>
+                      <a:prstDash val="solid"/>
+                      <a:round/>
+                      <a:headEnd type="none" w="med" len="med"/>
+                      <a:tailEnd type="none" w="med" len="med"/>
+                    </a:lnT>
+                    <a:lnB w="12700" cap="flat" cmpd="sng" algn="ctr">
+                      <a:solidFill>
+                        <a:srgbClr val="000000"/>
+                      </a:solidFill>
+                      <a:prstDash val="solid"/>
+                      <a:round/>
+                      <a:headEnd type="none" w="med" len="med"/>
+                      <a:tailEnd type="none" w="med" len="med"/>
+                    </a:lnB>
+                    <a:solidFill>
+                      <a:srgbClr val="BFBFBF"/>
+                    </a:solidFill>
+                  </a:tcPr>
+                </a:tc>
+                <a:tc>
+                  <a:txBody>
+                    <a:bodyPr/>
+                    <a:lstStyle/>
+                    <a:p>
+                      <a:pPr algn="ctr" fontAlgn="ctr"/>
+                      <a:r>
+                        <a:rPr lang="en-US" sz="1800" b="0" i="0" u="none" strike="noStrike">
+                          <a:solidFill>
+                            <a:srgbClr val="000000"/>
+                          </a:solidFill>
+                          <a:effectLst/>
+                          <a:latin typeface="Palatino"/>
+                        </a:rPr>
+                        <a:t>3</a:t>
+                      </a:r>
+                    </a:p>
+                  </a:txBody>
+                  <a:tcPr marL="12700" marR="12700" marT="12700" marB="0" anchor="ctr">
+                    <a:lnL w="6350" cap="flat" cmpd="sng" algn="ctr">
+                      <a:solidFill>
+                        <a:srgbClr val="000000"/>
+                      </a:solidFill>
+                      <a:prstDash val="solid"/>
+                      <a:round/>
+                      <a:headEnd type="none" w="med" len="med"/>
+                      <a:tailEnd type="none" w="med" len="med"/>
+                    </a:lnL>
+                    <a:lnR w="6350" cap="flat" cmpd="sng" algn="ctr">
+                      <a:solidFill>
+                        <a:srgbClr val="000000"/>
+                      </a:solidFill>
+                      <a:prstDash val="solid"/>
+                      <a:round/>
+                      <a:headEnd type="none" w="med" len="med"/>
+                      <a:tailEnd type="none" w="med" len="med"/>
+                    </a:lnR>
+                    <a:lnT w="6350" cap="flat" cmpd="sng" algn="ctr">
+                      <a:solidFill>
+                        <a:srgbClr val="000000"/>
+                      </a:solidFill>
+                      <a:prstDash val="solid"/>
+                      <a:round/>
+                      <a:headEnd type="none" w="med" len="med"/>
+                      <a:tailEnd type="none" w="med" len="med"/>
+                    </a:lnT>
+                    <a:lnB w="12700" cap="flat" cmpd="sng" algn="ctr">
+                      <a:solidFill>
+                        <a:srgbClr val="000000"/>
+                      </a:solidFill>
+                      <a:prstDash val="solid"/>
+                      <a:round/>
+                      <a:headEnd type="none" w="med" len="med"/>
+                      <a:tailEnd type="none" w="med" len="med"/>
+                    </a:lnB>
+                    <a:solidFill>
+                      <a:srgbClr val="BFBFBF"/>
+                    </a:solidFill>
+                  </a:tcPr>
+                </a:tc>
+                <a:tc>
+                  <a:txBody>
+                    <a:bodyPr/>
+                    <a:lstStyle/>
+                    <a:p>
+                      <a:pPr algn="ctr" fontAlgn="ctr"/>
+                      <a:r>
+                        <a:rPr lang="en-US" sz="1800" b="0" i="0" u="none" strike="noStrike" dirty="0">
+                          <a:solidFill>
+                            <a:srgbClr val="000000"/>
+                          </a:solidFill>
+                          <a:effectLst/>
+                          <a:latin typeface="Palatino"/>
+                        </a:rPr>
+                        <a:t>1</a:t>
+                      </a:r>
+                    </a:p>
+                  </a:txBody>
+                  <a:tcPr marL="12700" marR="12700" marT="12700" marB="0" anchor="ctr">
+                    <a:lnL w="6350" cap="flat" cmpd="sng" algn="ctr">
+                      <a:solidFill>
+                        <a:srgbClr val="000000"/>
+                      </a:solidFill>
+                      <a:prstDash val="solid"/>
+                      <a:round/>
+                      <a:headEnd type="none" w="med" len="med"/>
+                      <a:tailEnd type="none" w="med" len="med"/>
+                    </a:lnL>
+                    <a:lnR w="12700" cap="flat" cmpd="sng" algn="ctr">
+                      <a:solidFill>
+                        <a:srgbClr val="000000"/>
+                      </a:solidFill>
+                      <a:prstDash val="solid"/>
+                      <a:round/>
+                      <a:headEnd type="none" w="med" len="med"/>
+                      <a:tailEnd type="none" w="med" len="med"/>
+                    </a:lnR>
+                    <a:lnT w="6350" cap="flat" cmpd="sng" algn="ctr">
+                      <a:solidFill>
+                        <a:srgbClr val="000000"/>
+                      </a:solidFill>
+                      <a:prstDash val="solid"/>
+                      <a:round/>
+                      <a:headEnd type="none" w="med" len="med"/>
+                      <a:tailEnd type="none" w="med" len="med"/>
+                    </a:lnT>
+                    <a:lnB w="12700" cap="flat" cmpd="sng" algn="ctr">
+                      <a:solidFill>
+                        <a:srgbClr val="000000"/>
+                      </a:solidFill>
+                      <a:prstDash val="solid"/>
+                      <a:round/>
+                      <a:headEnd type="none" w="med" len="med"/>
+                      <a:tailEnd type="none" w="med" len="med"/>
+                    </a:lnB>
+                  </a:tcPr>
+                </a:tc>
+              </a:tr>
+            </a:tbl>
+          </a:graphicData>
+        </a:graphic>
+      </p:graphicFrame>
     </p:spTree>
     <p:extLst>
       <p:ext uri="{BB962C8B-B14F-4D97-AF65-F5344CB8AC3E}">
-        <p14:creationId xmlns:p14="http://schemas.microsoft.com/office/powerpoint/2010/main" val="2920314410"/>
+        <p14:creationId xmlns:p14="http://schemas.microsoft.com/office/powerpoint/2010/main" val="1798004871"/>
       </p:ext>
     </p:extLst>
   </p:cSld>
@@ -3857,9 +6020,7 @@
         </p:nvSpPr>
         <p:spPr/>
         <p:txBody>
-          <a:bodyPr>
-            <a:normAutofit fontScale="90000"/>
-          </a:bodyPr>
+          <a:bodyPr/>
           <a:lstStyle/>
           <a:p>
             <a:r>
@@ -3867,7 +6028,14 @@
                 <a:latin typeface="Palatino"/>
                 <a:cs typeface="Palatino"/>
               </a:rPr>
-              <a:t>Challenging Implementation Detail</a:t>
+              <a:t>System </a:t>
+            </a:r>
+            <a:r>
+              <a:rPr lang="en-US" dirty="0" smtClean="0">
+                <a:latin typeface="Palatino"/>
+                <a:cs typeface="Palatino"/>
+              </a:rPr>
+              <a:t>Overview/Design</a:t>
             </a:r>
             <a:endParaRPr lang="en-US" dirty="0">
               <a:latin typeface="Palatino"/>
@@ -3891,7 +6059,99 @@
           <a:bodyPr/>
           <a:lstStyle/>
           <a:p>
-            <a:endParaRPr lang="en-US" dirty="0">
+            <a:r>
+              <a:rPr lang="en-US" dirty="0" smtClean="0">
+                <a:latin typeface="Palatino"/>
+                <a:cs typeface="Palatino"/>
+              </a:rPr>
+              <a:t>GUI/bitmap</a:t>
+            </a:r>
+          </a:p>
+          <a:p>
+            <a:r>
+              <a:rPr lang="en-US" dirty="0" smtClean="0">
+                <a:latin typeface="Palatino"/>
+                <a:cs typeface="Palatino"/>
+              </a:rPr>
+              <a:t>CPU threads:</a:t>
+            </a:r>
+          </a:p>
+          <a:p>
+            <a:pPr lvl="1"/>
+            <a:r>
+              <a:rPr lang="en-US" dirty="0">
+                <a:latin typeface="Palatino"/>
+                <a:cs typeface="Palatino"/>
+              </a:rPr>
+              <a:t> mouse input</a:t>
+            </a:r>
+          </a:p>
+          <a:p>
+            <a:pPr lvl="1"/>
+            <a:r>
+              <a:rPr lang="en-US" dirty="0">
+                <a:latin typeface="Palatino"/>
+                <a:cs typeface="Palatino"/>
+              </a:rPr>
+              <a:t> keyboard input</a:t>
+            </a:r>
+          </a:p>
+          <a:p>
+            <a:pPr lvl="1"/>
+            <a:r>
+              <a:rPr lang="en-US" dirty="0">
+                <a:latin typeface="Palatino"/>
+                <a:cs typeface="Palatino"/>
+              </a:rPr>
+              <a:t> main (update</a:t>
+            </a:r>
+            <a:r>
+              <a:rPr lang="en-US" dirty="0" smtClean="0">
+                <a:latin typeface="Palatino"/>
+                <a:cs typeface="Palatino"/>
+              </a:rPr>
+              <a:t>)</a:t>
+            </a:r>
+          </a:p>
+          <a:p>
+            <a:r>
+              <a:rPr lang="en-US" dirty="0" smtClean="0">
+                <a:latin typeface="Palatino"/>
+                <a:cs typeface="Palatino"/>
+              </a:rPr>
+              <a:t>GPU kernels</a:t>
+            </a:r>
+          </a:p>
+          <a:p>
+            <a:pPr lvl="1"/>
+            <a:r>
+              <a:rPr lang="en-US" dirty="0" smtClean="0">
+                <a:latin typeface="Palatino"/>
+                <a:cs typeface="Palatino"/>
+              </a:rPr>
+              <a:t> count neighbors</a:t>
+            </a:r>
+          </a:p>
+          <a:p>
+            <a:pPr lvl="1"/>
+            <a:r>
+              <a:rPr lang="en-US" dirty="0">
+                <a:latin typeface="Palatino"/>
+                <a:cs typeface="Palatino"/>
+              </a:rPr>
+              <a:t> </a:t>
+            </a:r>
+            <a:r>
+              <a:rPr lang="en-US" dirty="0" smtClean="0">
+                <a:latin typeface="Palatino"/>
+                <a:cs typeface="Palatino"/>
+              </a:rPr>
+              <a:t>determine state </a:t>
+            </a:r>
+          </a:p>
+          <a:p>
+            <a:pPr lvl="1"/>
+            <a:endParaRPr lang="en-US" dirty="0" smtClean="0">
               <a:latin typeface="Palatino"/>
               <a:cs typeface="Palatino"/>
             </a:endParaRPr>
@@ -3901,7 +6161,7 @@
     </p:spTree>
     <p:extLst>
       <p:ext uri="{BB962C8B-B14F-4D97-AF65-F5344CB8AC3E}">
-        <p14:creationId xmlns:p14="http://schemas.microsoft.com/office/powerpoint/2010/main" val="2236143727"/>
+        <p14:creationId xmlns:p14="http://schemas.microsoft.com/office/powerpoint/2010/main" val="1754476318"/>
       </p:ext>
     </p:extLst>
   </p:cSld>
@@ -3948,7 +6208,7 @@
                 <a:latin typeface="Palatino"/>
                 <a:cs typeface="Palatino"/>
               </a:rPr>
-              <a:t>Lampson</a:t>
+              <a:t>High-Level Design</a:t>
             </a:r>
             <a:endParaRPr lang="en-US" dirty="0">
               <a:latin typeface="Palatino"/>
@@ -3973,11 +6233,25 @@
           <a:lstStyle/>
           <a:p>
             <a:r>
+              <a:rPr lang="en-US" dirty="0" err="1">
+                <a:latin typeface="Palatino"/>
+                <a:cs typeface="Palatino"/>
+              </a:rPr>
+              <a:t>p</a:t>
+            </a:r>
+            <a:r>
+              <a:rPr lang="en-US" dirty="0" err="1" smtClean="0">
+                <a:latin typeface="Palatino"/>
+                <a:cs typeface="Palatino"/>
+              </a:rPr>
+              <a:t>seudocode</a:t>
+            </a:r>
+            <a:r>
               <a:rPr lang="en-US" dirty="0" smtClean="0">
                 <a:latin typeface="Palatino"/>
                 <a:cs typeface="Palatino"/>
               </a:rPr>
-              <a:t>one of his hints and how it influenced design</a:t>
+              <a:t> for the whole thing? </a:t>
             </a:r>
             <a:endParaRPr lang="en-US" dirty="0">
               <a:latin typeface="Palatino"/>
@@ -3989,7 +6263,7 @@
     </p:spTree>
     <p:extLst>
       <p:ext uri="{BB962C8B-B14F-4D97-AF65-F5344CB8AC3E}">
-        <p14:creationId xmlns:p14="http://schemas.microsoft.com/office/powerpoint/2010/main" val="2958758538"/>
+        <p14:creationId xmlns:p14="http://schemas.microsoft.com/office/powerpoint/2010/main" val="2920314410"/>
       </p:ext>
     </p:extLst>
   </p:cSld>
@@ -4028,7 +6302,9 @@
         </p:nvSpPr>
         <p:spPr/>
         <p:txBody>
-          <a:bodyPr/>
+          <a:bodyPr>
+            <a:normAutofit fontScale="90000"/>
+          </a:bodyPr>
           <a:lstStyle/>
           <a:p>
             <a:r>
@@ -4036,7 +6312,7 @@
                 <a:latin typeface="Palatino"/>
                 <a:cs typeface="Palatino"/>
               </a:rPr>
-              <a:t>EVALUATIONS</a:t>
+              <a:t>Challenging Implementation Detail</a:t>
             </a:r>
             <a:endParaRPr lang="en-US" dirty="0">
               <a:latin typeface="Palatino"/>
@@ -4060,142 +6336,6 @@
           <a:bodyPr/>
           <a:lstStyle/>
           <a:p>
-            <a:r>
-              <a:rPr lang="en-US" dirty="0" smtClean="0">
-                <a:latin typeface="Palatino"/>
-                <a:cs typeface="Palatino"/>
-              </a:rPr>
-              <a:t>DO THE SERIAL THING</a:t>
-            </a:r>
-          </a:p>
-          <a:p>
-            <a:r>
-              <a:rPr lang="en-US" dirty="0" smtClean="0">
-                <a:latin typeface="Palatino"/>
-                <a:cs typeface="Palatino"/>
-              </a:rPr>
-              <a:t>TPB = 2^i for </a:t>
-            </a:r>
-            <a:r>
-              <a:rPr lang="en-US" dirty="0" err="1" smtClean="0">
-                <a:latin typeface="Palatino"/>
-                <a:cs typeface="Palatino"/>
-              </a:rPr>
-              <a:t>i</a:t>
-            </a:r>
-            <a:r>
-              <a:rPr lang="en-US" dirty="0" smtClean="0">
-                <a:latin typeface="Palatino"/>
-                <a:cs typeface="Palatino"/>
-              </a:rPr>
-              <a:t> \in \{1 \</a:t>
-            </a:r>
-            <a:r>
-              <a:rPr lang="en-US" dirty="0" err="1" smtClean="0">
-                <a:latin typeface="Palatino"/>
-                <a:cs typeface="Palatino"/>
-              </a:rPr>
-              <a:t>ttc</a:t>
-            </a:r>
-            <a:r>
-              <a:rPr lang="en-US" dirty="0" smtClean="0">
-                <a:latin typeface="Palatino"/>
-                <a:cs typeface="Palatino"/>
-              </a:rPr>
-              <a:t> ... \</a:t>
-            </a:r>
-            <a:r>
-              <a:rPr lang="en-US" dirty="0" err="1" smtClean="0">
-                <a:latin typeface="Palatino"/>
-                <a:cs typeface="Palatino"/>
-              </a:rPr>
-              <a:t>ttc</a:t>
-            </a:r>
-            <a:r>
-              <a:rPr lang="en-US" dirty="0" smtClean="0">
-                <a:latin typeface="Palatino"/>
-                <a:cs typeface="Palatino"/>
-              </a:rPr>
-              <a:t> 10\}</a:t>
-            </a:r>
-          </a:p>
-          <a:p>
-            <a:r>
-              <a:rPr lang="en-US" dirty="0" smtClean="0">
-                <a:latin typeface="Palatino"/>
-                <a:cs typeface="Palatino"/>
-              </a:rPr>
-              <a:t>RD =  2^i for </a:t>
-            </a:r>
-            <a:r>
-              <a:rPr lang="en-US" dirty="0" err="1" smtClean="0">
-                <a:latin typeface="Palatino"/>
-                <a:cs typeface="Palatino"/>
-              </a:rPr>
-              <a:t>i</a:t>
-            </a:r>
-            <a:r>
-              <a:rPr lang="en-US" dirty="0" smtClean="0">
-                <a:latin typeface="Palatino"/>
-                <a:cs typeface="Palatino"/>
-              </a:rPr>
-              <a:t> \in \{1 \</a:t>
-            </a:r>
-            <a:r>
-              <a:rPr lang="en-US" dirty="0" err="1" smtClean="0">
-                <a:latin typeface="Palatino"/>
-                <a:cs typeface="Palatino"/>
-              </a:rPr>
-              <a:t>ttc</a:t>
-            </a:r>
-            <a:r>
-              <a:rPr lang="en-US" dirty="0" smtClean="0">
-                <a:latin typeface="Palatino"/>
-                <a:cs typeface="Palatino"/>
-              </a:rPr>
-              <a:t> ... \</a:t>
-            </a:r>
-            <a:r>
-              <a:rPr lang="en-US" dirty="0" err="1" smtClean="0">
-                <a:latin typeface="Palatino"/>
-                <a:cs typeface="Palatino"/>
-              </a:rPr>
-              <a:t>ttc</a:t>
-            </a:r>
-            <a:r>
-              <a:rPr lang="en-US" dirty="0" smtClean="0">
-                <a:latin typeface="Palatino"/>
-                <a:cs typeface="Palatino"/>
-              </a:rPr>
-              <a:t> 4\} </a:t>
-            </a:r>
-          </a:p>
-          <a:p>
-            <a:pPr lvl="1"/>
-            <a:r>
-              <a:rPr lang="en-US" dirty="0" err="1">
-                <a:latin typeface="Palatino"/>
-                <a:cs typeface="Palatino"/>
-              </a:rPr>
-              <a:t>b</a:t>
-            </a:r>
-            <a:r>
-              <a:rPr lang="en-US" dirty="0" err="1" smtClean="0">
-                <a:latin typeface="Palatino"/>
-                <a:cs typeface="Palatino"/>
-              </a:rPr>
-              <a:t>ruh</a:t>
-            </a:r>
-            <a:r>
-              <a:rPr lang="en-US" dirty="0" smtClean="0">
-                <a:latin typeface="Palatino"/>
-                <a:cs typeface="Palatino"/>
-              </a:rPr>
-              <a:t> why are we switching to powers of 2</a:t>
-            </a:r>
-          </a:p>
-          <a:p>
-            <a:pPr lvl="1"/>
             <a:r>
               <a:rPr lang="en-US" dirty="0">
                 <a:latin typeface="Palatino"/>
@@ -4208,7 +6348,48 @@
                 <a:latin typeface="Palatino"/>
                 <a:cs typeface="Palatino"/>
               </a:rPr>
-              <a:t>hese aren’t geometric partitions...</a:t>
+              <a:t>aking in and acting on user input</a:t>
+            </a:r>
+          </a:p>
+          <a:p>
+            <a:pPr lvl="1"/>
+            <a:r>
+              <a:rPr lang="en-US" dirty="0" smtClean="0">
+                <a:latin typeface="Palatino"/>
+                <a:cs typeface="Palatino"/>
+              </a:rPr>
+              <a:t>Frequency</a:t>
+            </a:r>
+            <a:endParaRPr lang="en-US" dirty="0" smtClean="0">
+              <a:latin typeface="Palatino"/>
+              <a:cs typeface="Palatino"/>
+            </a:endParaRPr>
+          </a:p>
+          <a:p>
+            <a:pPr lvl="1"/>
+            <a:r>
+              <a:rPr lang="en-US" dirty="0">
+                <a:latin typeface="Palatino"/>
+                <a:cs typeface="Palatino"/>
+              </a:rPr>
+              <a:t>l</a:t>
+            </a:r>
+            <a:r>
+              <a:rPr lang="en-US" dirty="0" smtClean="0">
+                <a:latin typeface="Palatino"/>
+                <a:cs typeface="Palatino"/>
+              </a:rPr>
+              <a:t>atency</a:t>
+            </a:r>
+          </a:p>
+          <a:p>
+            <a:pPr lvl="1"/>
+            <a:r>
+              <a:rPr lang="en-US" dirty="0" smtClean="0">
+                <a:latin typeface="Palatino"/>
+                <a:cs typeface="Palatino"/>
+              </a:rPr>
+              <a:t>priority</a:t>
             </a:r>
             <a:endParaRPr lang="en-US" dirty="0">
               <a:latin typeface="Palatino"/>
@@ -4220,7 +6401,7 @@
     </p:spTree>
     <p:extLst>
       <p:ext uri="{BB962C8B-B14F-4D97-AF65-F5344CB8AC3E}">
-        <p14:creationId xmlns:p14="http://schemas.microsoft.com/office/powerpoint/2010/main" val="3785497598"/>
+        <p14:creationId xmlns:p14="http://schemas.microsoft.com/office/powerpoint/2010/main" val="2236143727"/>
       </p:ext>
     </p:extLst>
   </p:cSld>
@@ -4267,7 +6448,7 @@
                 <a:latin typeface="Palatino"/>
                 <a:cs typeface="Palatino"/>
               </a:rPr>
-              <a:t>Evaluation</a:t>
+              <a:t>Help from Lampson</a:t>
             </a:r>
             <a:endParaRPr lang="en-US" dirty="0">
               <a:latin typeface="Palatino"/>
@@ -4296,33 +6477,11 @@
                 <a:latin typeface="Palatino"/>
                 <a:cs typeface="Palatino"/>
               </a:rPr>
-              <a:t>Objective</a:t>
-            </a:r>
-          </a:p>
-          <a:p>
-            <a:r>
-              <a:rPr lang="en-US" dirty="0" smtClean="0">
-                <a:latin typeface="Palatino"/>
-                <a:cs typeface="Palatino"/>
-              </a:rPr>
-              <a:t>Pictures </a:t>
-            </a:r>
-          </a:p>
-          <a:p>
-            <a:r>
-              <a:rPr lang="en-US" dirty="0">
-                <a:latin typeface="Palatino"/>
-                <a:cs typeface="Palatino"/>
-              </a:rPr>
-              <a:t>I</a:t>
-            </a:r>
-            <a:r>
-              <a:rPr lang="en-US" dirty="0" smtClean="0">
-                <a:latin typeface="Palatino"/>
-                <a:cs typeface="Palatino"/>
-              </a:rPr>
-              <a:t>nterpretation</a:t>
-            </a:r>
+              <a:t>“Plan to throw one away.” </a:t>
+            </a:r>
+          </a:p>
+          <a:p>
+            <a:pPr lvl="1"/>
             <a:endParaRPr lang="en-US" dirty="0">
               <a:latin typeface="Palatino"/>
               <a:cs typeface="Palatino"/>
@@ -4333,7 +6492,7 @@
     </p:spTree>
     <p:extLst>
       <p:ext uri="{BB962C8B-B14F-4D97-AF65-F5344CB8AC3E}">
-        <p14:creationId xmlns:p14="http://schemas.microsoft.com/office/powerpoint/2010/main" val="611656846"/>
+        <p14:creationId xmlns:p14="http://schemas.microsoft.com/office/powerpoint/2010/main" val="2958758538"/>
       </p:ext>
     </p:extLst>
   </p:cSld>
@@ -4380,7 +6539,7 @@
                 <a:latin typeface="Palatino"/>
                 <a:cs typeface="Palatino"/>
               </a:rPr>
-              <a:t>Summary</a:t>
+              <a:t>Evaluation - Objective</a:t>
             </a:r>
             <a:endParaRPr lang="en-US" dirty="0">
               <a:latin typeface="Palatino"/>
@@ -4404,6 +6563,24 @@
           <a:bodyPr/>
           <a:lstStyle/>
           <a:p>
+            <a:r>
+              <a:rPr lang="en-US" dirty="0" smtClean="0">
+                <a:latin typeface="Palatino"/>
+                <a:cs typeface="Palatino"/>
+              </a:rPr>
+              <a:t>Serial stencil vs. parallel stencil on GPU</a:t>
+            </a:r>
+          </a:p>
+          <a:p>
+            <a:r>
+              <a:rPr lang="en-US" dirty="0" smtClean="0">
+                <a:latin typeface="Palatino"/>
+                <a:cs typeface="Palatino"/>
+              </a:rPr>
+              <a:t>Significance of allocating/copying</a:t>
+            </a:r>
+          </a:p>
+          <a:p>
             <a:endParaRPr lang="en-US" dirty="0">
               <a:latin typeface="Palatino"/>
               <a:cs typeface="Palatino"/>
@@ -4414,7 +6591,92 @@
     </p:spTree>
     <p:extLst>
       <p:ext uri="{BB962C8B-B14F-4D97-AF65-F5344CB8AC3E}">
-        <p14:creationId xmlns:p14="http://schemas.microsoft.com/office/powerpoint/2010/main" val="2484821231"/>
+        <p14:creationId xmlns:p14="http://schemas.microsoft.com/office/powerpoint/2010/main" val="611656846"/>
+      </p:ext>
+    </p:extLst>
+  </p:cSld>
+  <p:clrMapOvr>
+    <a:masterClrMapping/>
+  </p:clrMapOvr>
+</p:sld>
+</file>
+
+<file path=ppt/slides/slide9.xml><?xml version="1.0" encoding="utf-8"?>
+<p:sld xmlns:a="http://schemas.openxmlformats.org/drawingml/2006/main" xmlns:r="http://schemas.openxmlformats.org/officeDocument/2006/relationships" xmlns:p="http://schemas.openxmlformats.org/presentationml/2006/main">
+  <p:cSld>
+    <p:spTree>
+      <p:nvGrpSpPr>
+        <p:cNvPr id="1" name=""/>
+        <p:cNvGrpSpPr/>
+        <p:nvPr/>
+      </p:nvGrpSpPr>
+      <p:grpSpPr>
+        <a:xfrm>
+          <a:off x="0" y="0"/>
+          <a:ext cx="0" cy="0"/>
+          <a:chOff x="0" y="0"/>
+          <a:chExt cx="0" cy="0"/>
+        </a:xfrm>
+      </p:grpSpPr>
+      <p:sp>
+        <p:nvSpPr>
+          <p:cNvPr id="2" name="Title 1"/>
+          <p:cNvSpPr>
+            <a:spLocks noGrp="1"/>
+          </p:cNvSpPr>
+          <p:nvPr>
+            <p:ph type="title"/>
+          </p:nvPr>
+        </p:nvSpPr>
+        <p:spPr/>
+        <p:txBody>
+          <a:bodyPr/>
+          <a:lstStyle/>
+          <a:p>
+            <a:r>
+              <a:rPr lang="en-US" dirty="0">
+                <a:latin typeface="Palatino"/>
+                <a:cs typeface="Palatino"/>
+              </a:rPr>
+              <a:t>Evaluation - </a:t>
+            </a:r>
+            <a:r>
+              <a:rPr lang="en-US" dirty="0" smtClean="0">
+                <a:latin typeface="Palatino"/>
+                <a:cs typeface="Palatino"/>
+              </a:rPr>
+              <a:t>Figures</a:t>
+            </a:r>
+            <a:endParaRPr lang="en-US" dirty="0"/>
+          </a:p>
+        </p:txBody>
+      </p:sp>
+      <p:sp>
+        <p:nvSpPr>
+          <p:cNvPr id="3" name="Content Placeholder 2"/>
+          <p:cNvSpPr>
+            <a:spLocks noGrp="1"/>
+          </p:cNvSpPr>
+          <p:nvPr>
+            <p:ph idx="1"/>
+          </p:nvPr>
+        </p:nvSpPr>
+        <p:spPr/>
+        <p:txBody>
+          <a:bodyPr/>
+          <a:lstStyle/>
+          <a:p>
+            <a:endParaRPr lang="en-US" dirty="0">
+              <a:latin typeface="Palatino"/>
+              <a:cs typeface="Palatino"/>
+            </a:endParaRPr>
+          </a:p>
+        </p:txBody>
+      </p:sp>
+    </p:spTree>
+    <p:extLst>
+      <p:ext uri="{BB962C8B-B14F-4D97-AF65-F5344CB8AC3E}">
+        <p14:creationId xmlns:p14="http://schemas.microsoft.com/office/powerpoint/2010/main" val="4058655611"/>
       </p:ext>
     </p:extLst>
   </p:cSld>

</xml_diff>

<commit_message>
(anna) slight changes to two slide titles
</commit_message>
<xml_diff>
--- a/presentation/CSC213_presentation.pptx
+++ b/presentation/CSC213_presentation.pptx
@@ -4959,7 +4959,7 @@
               </a:lnSpc>
             </a:pPr>
             <a:r>
-              <a:rPr lang="en-US" sz="4400" b="0" strike="noStrike" spc="-1">
+              <a:rPr lang="en-US" sz="4400" b="0" strike="noStrike" spc="-1" dirty="0">
                 <a:solidFill>
                   <a:srgbClr val="000000"/>
                 </a:solidFill>
@@ -4970,9 +4970,23 @@
                 </a:uFill>
                 <a:latin typeface="Palatino"/>
               </a:rPr>
-              <a:t>Conway’s Game of Life</a:t>
+              <a:t>Conway’s </a:t>
             </a:r>
-            <a:endParaRPr lang="en-US" sz="1800" b="0" strike="noStrike" spc="-1">
+            <a:r>
+              <a:rPr lang="en-US" sz="4400" b="0" strike="noStrike" spc="-1" dirty="0" smtClean="0">
+                <a:solidFill>
+                  <a:srgbClr val="000000"/>
+                </a:solidFill>
+                <a:uFill>
+                  <a:solidFill>
+                    <a:srgbClr val="FFFFFF"/>
+                  </a:solidFill>
+                </a:uFill>
+                <a:latin typeface="Palatino"/>
+              </a:rPr>
+              <a:t>Algorithm</a:t>
+            </a:r>
+            <a:endParaRPr lang="en-US" sz="1800" b="0" strike="noStrike" spc="-1" dirty="0">
               <a:solidFill>
                 <a:srgbClr val="000000"/>
               </a:solidFill>
@@ -5239,7 +5253,7 @@
               </a:lnSpc>
             </a:pPr>
             <a:r>
-              <a:rPr lang="en-US" sz="4400" b="0" strike="noStrike" spc="-1">
+              <a:rPr lang="en-US" sz="4400" b="0" strike="noStrike" spc="-1" dirty="0">
                 <a:solidFill>
                   <a:srgbClr val="000000"/>
                 </a:solidFill>
@@ -5250,9 +5264,23 @@
                 </a:uFill>
                 <a:latin typeface="Palatino"/>
               </a:rPr>
-              <a:t>Conway’s Game of Life</a:t>
+              <a:t>Conway’s </a:t>
             </a:r>
-            <a:endParaRPr lang="en-US" sz="1800" b="0" strike="noStrike" spc="-1">
+            <a:r>
+              <a:rPr lang="en-US" sz="4400" b="0" strike="noStrike" spc="-1" dirty="0" smtClean="0">
+                <a:solidFill>
+                  <a:srgbClr val="000000"/>
+                </a:solidFill>
+                <a:uFill>
+                  <a:solidFill>
+                    <a:srgbClr val="FFFFFF"/>
+                  </a:solidFill>
+                </a:uFill>
+                <a:latin typeface="Palatino"/>
+              </a:rPr>
+              <a:t>Algorithm - Example</a:t>
+            </a:r>
+            <a:endParaRPr lang="en-US" sz="1800" b="0" strike="noStrike" spc="-1" dirty="0">
               <a:solidFill>
                 <a:srgbClr val="000000"/>
               </a:solidFill>
@@ -8882,7 +8910,7 @@
               <a:buChar char="•"/>
             </a:pPr>
             <a:r>
-              <a:rPr lang="en-US" sz="3200" b="0" strike="noStrike" spc="-1">
+              <a:rPr lang="en-US" sz="3200" b="0" strike="noStrike" spc="-1" dirty="0">
                 <a:solidFill>
                   <a:srgbClr val="000000"/>
                 </a:solidFill>
@@ -8895,7 +8923,7 @@
               </a:rPr>
               <a:t>Copying is expensive </a:t>
             </a:r>
-            <a:endParaRPr lang="en-US" sz="3200" b="0" strike="noStrike" spc="-1">
+            <a:endParaRPr lang="en-US" sz="3200" b="0" strike="noStrike" spc="-1" dirty="0">
               <a:solidFill>
                 <a:srgbClr val="000000"/>
               </a:solidFill>
@@ -8919,7 +8947,7 @@
               <a:buChar char="•"/>
             </a:pPr>
             <a:r>
-              <a:rPr lang="en-US" sz="3200" b="0" strike="noStrike" spc="-1">
+              <a:rPr lang="en-US" sz="3200" b="0" strike="noStrike" spc="-1" dirty="0">
                 <a:solidFill>
                   <a:srgbClr val="000000"/>
                 </a:solidFill>
@@ -8932,7 +8960,7 @@
               </a:rPr>
               <a:t>GPUs improve program speed (regardless of number of threads per block)</a:t>
             </a:r>
-            <a:endParaRPr lang="en-US" sz="3200" b="0" strike="noStrike" spc="-1">
+            <a:endParaRPr lang="en-US" sz="3200" b="0" strike="noStrike" spc="-1" dirty="0">
               <a:solidFill>
                 <a:srgbClr val="000000"/>
               </a:solidFill>
@@ -8956,7 +8984,7 @@
               <a:buChar char="•"/>
             </a:pPr>
             <a:r>
-              <a:rPr lang="en-US" sz="3200" b="0" strike="noStrike" spc="-1">
+              <a:rPr lang="en-US" sz="3200" b="0" strike="noStrike" spc="-1" dirty="0">
                 <a:solidFill>
                   <a:srgbClr val="000000"/>
                 </a:solidFill>
@@ -8969,7 +8997,7 @@
               </a:rPr>
               <a:t>Threads manage user input well</a:t>
             </a:r>
-            <a:endParaRPr lang="en-US" sz="3200" b="0" strike="noStrike" spc="-1">
+            <a:endParaRPr lang="en-US" sz="3200" b="0" strike="noStrike" spc="-1" dirty="0">
               <a:solidFill>
                 <a:srgbClr val="000000"/>
               </a:solidFill>
@@ -8993,7 +9021,7 @@
               <a:buChar char="•"/>
             </a:pPr>
             <a:r>
-              <a:rPr lang="en-US" sz="3200" b="0" strike="noStrike" spc="-1">
+              <a:rPr lang="en-US" sz="3200" b="0" strike="noStrike" spc="-1" dirty="0">
                 <a:solidFill>
                   <a:srgbClr val="000000"/>
                 </a:solidFill>
@@ -9006,7 +9034,7 @@
               </a:rPr>
               <a:t>Edge cases are difficult</a:t>
             </a:r>
-            <a:endParaRPr lang="en-US" sz="3200" b="0" strike="noStrike" spc="-1">
+            <a:endParaRPr lang="en-US" sz="3200" b="0" strike="noStrike" spc="-1" dirty="0">
               <a:solidFill>
                 <a:srgbClr val="000000"/>
               </a:solidFill>
@@ -9024,7 +9052,7 @@
                 <a:spcPct val="100000"/>
               </a:lnSpc>
             </a:pPr>
-            <a:endParaRPr lang="en-US" sz="3200" b="0" strike="noStrike" spc="-1">
+            <a:endParaRPr lang="en-US" sz="3200" b="0" strike="noStrike" spc="-1" dirty="0">
               <a:solidFill>
                 <a:srgbClr val="000000"/>
               </a:solidFill>
@@ -9042,7 +9070,7 @@
                 <a:spcPct val="100000"/>
               </a:lnSpc>
             </a:pPr>
-            <a:endParaRPr lang="en-US" sz="3200" b="0" strike="noStrike" spc="-1">
+            <a:endParaRPr lang="en-US" sz="3200" b="0" strike="noStrike" spc="-1" dirty="0">
               <a:solidFill>
                 <a:srgbClr val="000000"/>
               </a:solidFill>

</xml_diff>

<commit_message>
(anna) divvied up tasks for report
</commit_message>
<xml_diff>
--- a/presentation/CSC213_presentation.pptx
+++ b/presentation/CSC213_presentation.pptx
@@ -8146,7 +8146,7 @@
               <a:buChar char="•"/>
             </a:pPr>
             <a:r>
-              <a:rPr lang="en-US" sz="3200" b="0" strike="noStrike" spc="-1">
+              <a:rPr lang="en-US" sz="3200" b="0" strike="noStrike" spc="-1" dirty="0">
                 <a:solidFill>
                   <a:srgbClr val="000000"/>
                 </a:solidFill>
@@ -8159,7 +8159,7 @@
               </a:rPr>
               <a:t>taking in and acting on user input</a:t>
             </a:r>
-            <a:endParaRPr lang="en-US" sz="3200" b="0" strike="noStrike" spc="-1">
+            <a:endParaRPr lang="en-US" sz="3200" b="0" strike="noStrike" spc="-1" dirty="0">
               <a:solidFill>
                 <a:srgbClr val="000000"/>
               </a:solidFill>
@@ -8183,7 +8183,7 @@
               <a:buChar char="–"/>
             </a:pPr>
             <a:r>
-              <a:rPr lang="en-US" sz="2800" b="0" strike="noStrike" spc="-1">
+              <a:rPr lang="en-US" sz="2800" b="0" strike="noStrike" spc="-1" dirty="0">
                 <a:solidFill>
                   <a:srgbClr val="000000"/>
                 </a:solidFill>
@@ -8196,7 +8196,7 @@
               </a:rPr>
               <a:t>frequency</a:t>
             </a:r>
-            <a:endParaRPr lang="en-US" sz="2400" b="0" strike="noStrike" spc="-1">
+            <a:endParaRPr lang="en-US" sz="2400" b="0" strike="noStrike" spc="-1" dirty="0">
               <a:solidFill>
                 <a:srgbClr val="000000"/>
               </a:solidFill>
@@ -8220,7 +8220,7 @@
               <a:buChar char="–"/>
             </a:pPr>
             <a:r>
-              <a:rPr lang="en-US" sz="2800" b="0" strike="noStrike" spc="-1">
+              <a:rPr lang="en-US" sz="2800" b="0" strike="noStrike" spc="-1" dirty="0">
                 <a:solidFill>
                   <a:srgbClr val="000000"/>
                 </a:solidFill>
@@ -8233,7 +8233,7 @@
               </a:rPr>
               <a:t>latency</a:t>
             </a:r>
-            <a:endParaRPr lang="en-US" sz="2400" b="0" strike="noStrike" spc="-1">
+            <a:endParaRPr lang="en-US" sz="2400" b="0" strike="noStrike" spc="-1" dirty="0">
               <a:solidFill>
                 <a:srgbClr val="000000"/>
               </a:solidFill>
@@ -8257,7 +8257,7 @@
               <a:buChar char="–"/>
             </a:pPr>
             <a:r>
-              <a:rPr lang="en-US" sz="2800" b="0" strike="noStrike" spc="-1">
+              <a:rPr lang="en-US" sz="2800" b="0" strike="noStrike" spc="-1" dirty="0">
                 <a:solidFill>
                   <a:srgbClr val="000000"/>
                 </a:solidFill>
@@ -8270,7 +8270,7 @@
               </a:rPr>
               <a:t>priority</a:t>
             </a:r>
-            <a:endParaRPr lang="en-US" sz="2400" b="0" strike="noStrike" spc="-1">
+            <a:endParaRPr lang="en-US" sz="2400" b="0" strike="noStrike" spc="-1" dirty="0">
               <a:solidFill>
                 <a:srgbClr val="000000"/>
               </a:solidFill>
@@ -8294,7 +8294,7 @@
               <a:buChar char="•"/>
             </a:pPr>
             <a:r>
-              <a:rPr lang="en-US" sz="3200" b="0" strike="noStrike" spc="-1">
+              <a:rPr lang="en-US" sz="3200" b="0" strike="noStrike" spc="-1" dirty="0">
                 <a:solidFill>
                   <a:srgbClr val="000000"/>
                 </a:solidFill>
@@ -8307,7 +8307,7 @@
               </a:rPr>
               <a:t>help from Lampson</a:t>
             </a:r>
-            <a:endParaRPr lang="en-US" sz="3200" b="0" strike="noStrike" spc="-1">
+            <a:endParaRPr lang="en-US" sz="3200" b="0" strike="noStrike" spc="-1" dirty="0">
               <a:solidFill>
                 <a:srgbClr val="000000"/>
               </a:solidFill>
@@ -8331,7 +8331,7 @@
               <a:buChar char="–"/>
             </a:pPr>
             <a:r>
-              <a:rPr lang="en-US" sz="2800" b="0" strike="noStrike" spc="-1">
+              <a:rPr lang="en-US" sz="2800" b="0" strike="noStrike" spc="-1" dirty="0">
                 <a:solidFill>
                   <a:srgbClr val="000000"/>
                 </a:solidFill>
@@ -8344,7 +8344,7 @@
               </a:rPr>
               <a:t>“Plan to throw one away.”</a:t>
             </a:r>
-            <a:endParaRPr lang="en-US" sz="2400" b="0" strike="noStrike" spc="-1">
+            <a:endParaRPr lang="en-US" sz="2400" b="0" strike="noStrike" spc="-1" dirty="0">
               <a:solidFill>
                 <a:srgbClr val="000000"/>
               </a:solidFill>

</xml_diff>